<commit_message>
Finished lecture 4 slides
</commit_message>
<xml_diff>
--- a/slides/4_OrderStatistics/figures.pptx
+++ b/slides/4_OrderStatistics/figures.pptx
@@ -12,6 +12,7 @@
     <p:sldId id="260" r:id="rId6"/>
     <p:sldId id="262" r:id="rId7"/>
     <p:sldId id="261" r:id="rId8"/>
+    <p:sldId id="263" r:id="rId9"/>
   </p:sldIdLst>
   <p:sldSz cx="12192000" cy="6858000"/>
   <p:notesSz cx="6858000" cy="9144000"/>
@@ -249,7 +250,7 @@
           <a:p>
             <a:fld id="{4E3B3619-B9B0-42E4-87A2-79BA2566015F}" type="datetimeFigureOut">
               <a:rPr lang="en-US" smtClean="0"/>
-              <a:t>9/11/2014</a:t>
+              <a:t>9/12/2014</a:t>
             </a:fld>
             <a:endParaRPr lang="en-US"/>
           </a:p>
@@ -419,7 +420,7 @@
           <a:p>
             <a:fld id="{4E3B3619-B9B0-42E4-87A2-79BA2566015F}" type="datetimeFigureOut">
               <a:rPr lang="en-US" smtClean="0"/>
-              <a:t>9/11/2014</a:t>
+              <a:t>9/12/2014</a:t>
             </a:fld>
             <a:endParaRPr lang="en-US"/>
           </a:p>
@@ -599,7 +600,7 @@
           <a:p>
             <a:fld id="{4E3B3619-B9B0-42E4-87A2-79BA2566015F}" type="datetimeFigureOut">
               <a:rPr lang="en-US" smtClean="0"/>
-              <a:t>9/11/2014</a:t>
+              <a:t>9/12/2014</a:t>
             </a:fld>
             <a:endParaRPr lang="en-US"/>
           </a:p>
@@ -769,7 +770,7 @@
           <a:p>
             <a:fld id="{4E3B3619-B9B0-42E4-87A2-79BA2566015F}" type="datetimeFigureOut">
               <a:rPr lang="en-US" smtClean="0"/>
-              <a:t>9/11/2014</a:t>
+              <a:t>9/12/2014</a:t>
             </a:fld>
             <a:endParaRPr lang="en-US"/>
           </a:p>
@@ -1015,7 +1016,7 @@
           <a:p>
             <a:fld id="{4E3B3619-B9B0-42E4-87A2-79BA2566015F}" type="datetimeFigureOut">
               <a:rPr lang="en-US" smtClean="0"/>
-              <a:t>9/11/2014</a:t>
+              <a:t>9/12/2014</a:t>
             </a:fld>
             <a:endParaRPr lang="en-US"/>
           </a:p>
@@ -1247,7 +1248,7 @@
           <a:p>
             <a:fld id="{4E3B3619-B9B0-42E4-87A2-79BA2566015F}" type="datetimeFigureOut">
               <a:rPr lang="en-US" smtClean="0"/>
-              <a:t>9/11/2014</a:t>
+              <a:t>9/12/2014</a:t>
             </a:fld>
             <a:endParaRPr lang="en-US"/>
           </a:p>
@@ -1614,7 +1615,7 @@
           <a:p>
             <a:fld id="{4E3B3619-B9B0-42E4-87A2-79BA2566015F}" type="datetimeFigureOut">
               <a:rPr lang="en-US" smtClean="0"/>
-              <a:t>9/11/2014</a:t>
+              <a:t>9/12/2014</a:t>
             </a:fld>
             <a:endParaRPr lang="en-US"/>
           </a:p>
@@ -1732,7 +1733,7 @@
           <a:p>
             <a:fld id="{4E3B3619-B9B0-42E4-87A2-79BA2566015F}" type="datetimeFigureOut">
               <a:rPr lang="en-US" smtClean="0"/>
-              <a:t>9/11/2014</a:t>
+              <a:t>9/12/2014</a:t>
             </a:fld>
             <a:endParaRPr lang="en-US"/>
           </a:p>
@@ -1827,7 +1828,7 @@
           <a:p>
             <a:fld id="{4E3B3619-B9B0-42E4-87A2-79BA2566015F}" type="datetimeFigureOut">
               <a:rPr lang="en-US" smtClean="0"/>
-              <a:t>9/11/2014</a:t>
+              <a:t>9/12/2014</a:t>
             </a:fld>
             <a:endParaRPr lang="en-US"/>
           </a:p>
@@ -2104,7 +2105,7 @@
           <a:p>
             <a:fld id="{4E3B3619-B9B0-42E4-87A2-79BA2566015F}" type="datetimeFigureOut">
               <a:rPr lang="en-US" smtClean="0"/>
-              <a:t>9/11/2014</a:t>
+              <a:t>9/12/2014</a:t>
             </a:fld>
             <a:endParaRPr lang="en-US"/>
           </a:p>
@@ -2357,7 +2358,7 @@
           <a:p>
             <a:fld id="{4E3B3619-B9B0-42E4-87A2-79BA2566015F}" type="datetimeFigureOut">
               <a:rPr lang="en-US" smtClean="0"/>
-              <a:t>9/11/2014</a:t>
+              <a:t>9/12/2014</a:t>
             </a:fld>
             <a:endParaRPr lang="en-US"/>
           </a:p>
@@ -2570,7 +2571,7 @@
           <a:p>
             <a:fld id="{4E3B3619-B9B0-42E4-87A2-79BA2566015F}" type="datetimeFigureOut">
               <a:rPr lang="en-US" smtClean="0"/>
-              <a:t>9/11/2014</a:t>
+              <a:t>9/12/2014</a:t>
             </a:fld>
             <a:endParaRPr lang="en-US"/>
           </a:p>
@@ -6409,7 +6410,6 @@
               <a:rPr lang="en-US" sz="2800" b="1" dirty="0"/>
               <a:t>8</a:t>
             </a:r>
-            <a:endParaRPr lang="en-US" sz="2800" b="1" dirty="0"/>
           </a:p>
         </p:txBody>
       </p:sp>
@@ -6439,7 +6439,6 @@
               <a:rPr lang="en-US" sz="2800" b="1" dirty="0"/>
               <a:t>5</a:t>
             </a:r>
-            <a:endParaRPr lang="en-US" sz="2800" b="1" dirty="0"/>
           </a:p>
         </p:txBody>
       </p:sp>
@@ -6751,7 +6750,6 @@
               <a:rPr lang="en-US" sz="2800" b="1" dirty="0"/>
               <a:t>8</a:t>
             </a:r>
-            <a:endParaRPr lang="en-US" sz="2800" b="1" dirty="0"/>
           </a:p>
         </p:txBody>
       </p:sp>
@@ -8052,7 +8050,6 @@
               <a:rPr lang="en-US" sz="2800" b="1" dirty="0"/>
               <a:t>8</a:t>
             </a:r>
-            <a:endParaRPr lang="en-US" sz="2800" b="1" dirty="0"/>
           </a:p>
         </p:txBody>
       </p:sp>
@@ -8082,7 +8079,6 @@
               <a:rPr lang="en-US" sz="2800" b="1" dirty="0"/>
               <a:t>5</a:t>
             </a:r>
-            <a:endParaRPr lang="en-US" sz="2800" b="1" dirty="0"/>
           </a:p>
         </p:txBody>
       </p:sp>
@@ -8394,7 +8390,6 @@
               <a:rPr lang="en-US" sz="2800" b="1" dirty="0"/>
               <a:t>8</a:t>
             </a:r>
-            <a:endParaRPr lang="en-US" sz="2800" b="1" dirty="0"/>
           </a:p>
         </p:txBody>
       </p:sp>
@@ -10444,6 +10439,45 @@
               <a:t>Partition</a:t>
             </a:r>
             <a:endParaRPr lang="en-US" sz="3200" b="1" dirty="0"/>
+          </a:p>
+        </p:txBody>
+      </p:sp>
+      <p:sp>
+        <p:nvSpPr>
+          <p:cNvPr id="2" name="Right Brace 1"/>
+          <p:cNvSpPr/>
+          <p:nvPr/>
+        </p:nvSpPr>
+        <p:spPr>
+          <a:xfrm rot="5400000">
+            <a:off x="4448562" y="1719776"/>
+            <a:ext cx="682284" cy="5317588"/>
+          </a:xfrm>
+          <a:prstGeom prst="rightBrace">
+            <a:avLst/>
+          </a:prstGeom>
+          <a:ln w="57150"/>
+        </p:spPr>
+        <p:style>
+          <a:lnRef idx="1">
+            <a:schemeClr val="accent1"/>
+          </a:lnRef>
+          <a:fillRef idx="0">
+            <a:schemeClr val="accent1"/>
+          </a:fillRef>
+          <a:effectRef idx="0">
+            <a:schemeClr val="accent1"/>
+          </a:effectRef>
+          <a:fontRef idx="minor">
+            <a:schemeClr val="tx1"/>
+          </a:fontRef>
+        </p:style>
+        <p:txBody>
+          <a:bodyPr rtlCol="0" anchor="ctr"/>
+          <a:lstStyle/>
+          <a:p>
+            <a:pPr algn="ctr"/>
+            <a:endParaRPr lang="en-US"/>
           </a:p>
         </p:txBody>
       </p:sp>
@@ -11729,6 +11763,84 @@
           </a:p>
         </p:txBody>
       </p:sp>
+      <p:sp>
+        <p:nvSpPr>
+          <p:cNvPr id="8" name="Right Brace 7"/>
+          <p:cNvSpPr/>
+          <p:nvPr/>
+        </p:nvSpPr>
+        <p:spPr>
+          <a:xfrm rot="5400000">
+            <a:off x="4974024" y="1194313"/>
+            <a:ext cx="682284" cy="6368513"/>
+          </a:xfrm>
+          <a:prstGeom prst="rightBrace">
+            <a:avLst/>
+          </a:prstGeom>
+          <a:ln w="57150"/>
+        </p:spPr>
+        <p:style>
+          <a:lnRef idx="1">
+            <a:schemeClr val="accent1"/>
+          </a:lnRef>
+          <a:fillRef idx="0">
+            <a:schemeClr val="accent1"/>
+          </a:fillRef>
+          <a:effectRef idx="0">
+            <a:schemeClr val="accent1"/>
+          </a:effectRef>
+          <a:fontRef idx="minor">
+            <a:schemeClr val="tx1"/>
+          </a:fontRef>
+        </p:style>
+        <p:txBody>
+          <a:bodyPr rtlCol="0" anchor="ctr"/>
+          <a:lstStyle/>
+          <a:p>
+            <a:pPr algn="ctr"/>
+            <a:endParaRPr lang="en-US"/>
+          </a:p>
+        </p:txBody>
+      </p:sp>
+      <p:sp>
+        <p:nvSpPr>
+          <p:cNvPr id="2" name="TextBox 1"/>
+          <p:cNvSpPr txBox="1"/>
+          <p:nvPr/>
+        </p:nvSpPr>
+        <p:spPr>
+          <a:xfrm>
+            <a:off x="5066675" y="4586990"/>
+            <a:ext cx="6595673" cy="523220"/>
+          </a:xfrm>
+          <a:prstGeom prst="rect">
+            <a:avLst/>
+          </a:prstGeom>
+          <a:noFill/>
+        </p:spPr>
+        <p:txBody>
+          <a:bodyPr wrap="square" rtlCol="0">
+            <a:spAutoFit/>
+          </a:bodyPr>
+          <a:lstStyle/>
+          <a:p>
+            <a:pPr algn="ctr"/>
+            <a:r>
+              <a:rPr lang="en-US" sz="2800" b="1" dirty="0" smtClean="0"/>
+              <a:t>Select 7</a:t>
+            </a:r>
+            <a:r>
+              <a:rPr lang="en-US" sz="2800" b="1" baseline="30000" dirty="0" smtClean="0"/>
+              <a:t>th</a:t>
+            </a:r>
+            <a:r>
+              <a:rPr lang="en-US" sz="2800" b="1" dirty="0" smtClean="0"/>
+              <a:t> Smallest Element Recursively</a:t>
+            </a:r>
+            <a:endParaRPr lang="en-US" sz="2800" b="1" dirty="0"/>
+          </a:p>
+        </p:txBody>
+      </p:sp>
     </p:spTree>
     <p:extLst>
       <p:ext uri="{BB962C8B-B14F-4D97-AF65-F5344CB8AC3E}">
@@ -12995,10 +13107,2627 @@
           </a:p>
         </p:txBody>
       </p:sp>
+      <p:sp>
+        <p:nvSpPr>
+          <p:cNvPr id="8" name="Right Brace 7"/>
+          <p:cNvSpPr/>
+          <p:nvPr/>
+        </p:nvSpPr>
+        <p:spPr>
+          <a:xfrm rot="5400000">
+            <a:off x="6937736" y="1597764"/>
+            <a:ext cx="682284" cy="5529063"/>
+          </a:xfrm>
+          <a:prstGeom prst="rightBrace">
+            <a:avLst/>
+          </a:prstGeom>
+          <a:ln w="57150"/>
+        </p:spPr>
+        <p:style>
+          <a:lnRef idx="1">
+            <a:schemeClr val="accent1"/>
+          </a:lnRef>
+          <a:fillRef idx="0">
+            <a:schemeClr val="accent1"/>
+          </a:fillRef>
+          <a:effectRef idx="0">
+            <a:schemeClr val="accent1"/>
+          </a:effectRef>
+          <a:fontRef idx="minor">
+            <a:schemeClr val="tx1"/>
+          </a:fontRef>
+        </p:style>
+        <p:txBody>
+          <a:bodyPr rtlCol="0" anchor="ctr"/>
+          <a:lstStyle/>
+          <a:p>
+            <a:pPr algn="ctr"/>
+            <a:endParaRPr lang="en-US"/>
+          </a:p>
+        </p:txBody>
+      </p:sp>
+      <p:sp>
+        <p:nvSpPr>
+          <p:cNvPr id="9" name="TextBox 8"/>
+          <p:cNvSpPr txBox="1"/>
+          <p:nvPr/>
+        </p:nvSpPr>
+        <p:spPr>
+          <a:xfrm>
+            <a:off x="3912434" y="4871803"/>
+            <a:ext cx="7135318" cy="523220"/>
+          </a:xfrm>
+          <a:prstGeom prst="rect">
+            <a:avLst/>
+          </a:prstGeom>
+          <a:noFill/>
+        </p:spPr>
+        <p:txBody>
+          <a:bodyPr wrap="square" rtlCol="0">
+            <a:spAutoFit/>
+          </a:bodyPr>
+          <a:lstStyle/>
+          <a:p>
+            <a:pPr algn="ctr"/>
+            <a:r>
+              <a:rPr lang="en-US" sz="2800" b="1" dirty="0" smtClean="0"/>
+              <a:t>Select 7-3 = 4</a:t>
+            </a:r>
+            <a:r>
+              <a:rPr lang="en-US" sz="2800" b="1" baseline="30000" dirty="0" smtClean="0"/>
+              <a:t>th</a:t>
+            </a:r>
+            <a:r>
+              <a:rPr lang="en-US" sz="2800" b="1" dirty="0" smtClean="0"/>
+              <a:t> Smallest Element Recursively</a:t>
+            </a:r>
+            <a:endParaRPr lang="en-US" sz="2800" b="1" dirty="0"/>
+          </a:p>
+        </p:txBody>
+      </p:sp>
     </p:spTree>
     <p:extLst>
       <p:ext uri="{BB962C8B-B14F-4D97-AF65-F5344CB8AC3E}">
         <p14:creationId xmlns:p14="http://schemas.microsoft.com/office/powerpoint/2010/main" val="3394691724"/>
+      </p:ext>
+    </p:extLst>
+  </p:cSld>
+  <p:clrMapOvr>
+    <a:masterClrMapping/>
+  </p:clrMapOvr>
+</p:sld>
+</file>
+
+<file path=ppt/slides/slide8.xml><?xml version="1.0" encoding="utf-8"?>
+<p:sld xmlns:a="http://schemas.openxmlformats.org/drawingml/2006/main" xmlns:r="http://schemas.openxmlformats.org/officeDocument/2006/relationships" xmlns:p="http://schemas.openxmlformats.org/presentationml/2006/main">
+  <p:cSld>
+    <p:spTree>
+      <p:nvGrpSpPr>
+        <p:cNvPr id="1" name=""/>
+        <p:cNvGrpSpPr/>
+        <p:nvPr/>
+      </p:nvGrpSpPr>
+      <p:grpSpPr>
+        <a:xfrm>
+          <a:off x="0" y="0"/>
+          <a:ext cx="0" cy="0"/>
+          <a:chOff x="0" y="0"/>
+          <a:chExt cx="0" cy="0"/>
+        </a:xfrm>
+      </p:grpSpPr>
+      <p:graphicFrame>
+        <p:nvGraphicFramePr>
+          <p:cNvPr id="4" name="Table 3"/>
+          <p:cNvGraphicFramePr>
+            <a:graphicFrameLocks noGrp="1"/>
+          </p:cNvGraphicFramePr>
+          <p:nvPr>
+            <p:extLst>
+              <p:ext uri="{D42A27DB-BD31-4B8C-83A1-F6EECF244321}">
+                <p14:modId xmlns:p14="http://schemas.microsoft.com/office/powerpoint/2010/main" val="1302846451"/>
+              </p:ext>
+            </p:extLst>
+          </p:nvPr>
+        </p:nvGraphicFramePr>
+        <p:xfrm>
+          <a:off x="2834807" y="569764"/>
+          <a:ext cx="6502400" cy="579120"/>
+        </p:xfrm>
+        <a:graphic>
+          <a:graphicData uri="http://schemas.openxmlformats.org/drawingml/2006/table">
+            <a:tbl>
+              <a:tblPr>
+                <a:tableStyleId>{5C22544A-7EE6-4342-B048-85BDC9FD1C3A}</a:tableStyleId>
+              </a:tblPr>
+              <a:tblGrid>
+                <a:gridCol w="812800"/>
+                <a:gridCol w="812800"/>
+                <a:gridCol w="812800"/>
+                <a:gridCol w="812800"/>
+                <a:gridCol w="812800"/>
+                <a:gridCol w="812800"/>
+                <a:gridCol w="812800"/>
+                <a:gridCol w="812800"/>
+              </a:tblGrid>
+              <a:tr h="370840">
+                <a:tc>
+                  <a:txBody>
+                    <a:bodyPr/>
+                    <a:lstStyle/>
+                    <a:p>
+                      <a:pPr algn="ctr"/>
+                      <a:r>
+                        <a:rPr lang="en-US" sz="3200" b="1" dirty="0" smtClean="0"/>
+                        <a:t>M</a:t>
+                      </a:r>
+                      <a:endParaRPr lang="en-US" sz="3200" b="1" dirty="0"/>
+                    </a:p>
+                  </a:txBody>
+                  <a:tcPr>
+                    <a:lnL w="12700" cap="flat" cmpd="sng" algn="ctr">
+                      <a:solidFill>
+                        <a:schemeClr val="tx1"/>
+                      </a:solidFill>
+                      <a:prstDash val="solid"/>
+                      <a:round/>
+                      <a:headEnd type="none" w="med" len="med"/>
+                      <a:tailEnd type="none" w="med" len="med"/>
+                    </a:lnL>
+                    <a:lnR w="12700" cap="flat" cmpd="sng" algn="ctr">
+                      <a:solidFill>
+                        <a:schemeClr val="tx1"/>
+                      </a:solidFill>
+                      <a:prstDash val="solid"/>
+                      <a:round/>
+                      <a:headEnd type="none" w="med" len="med"/>
+                      <a:tailEnd type="none" w="med" len="med"/>
+                    </a:lnR>
+                    <a:lnT w="12700" cap="flat" cmpd="sng" algn="ctr">
+                      <a:solidFill>
+                        <a:schemeClr val="tx1"/>
+                      </a:solidFill>
+                      <a:prstDash val="solid"/>
+                      <a:round/>
+                      <a:headEnd type="none" w="med" len="med"/>
+                      <a:tailEnd type="none" w="med" len="med"/>
+                    </a:lnT>
+                    <a:lnB w="12700" cap="flat" cmpd="sng" algn="ctr">
+                      <a:solidFill>
+                        <a:schemeClr val="tx1"/>
+                      </a:solidFill>
+                      <a:prstDash val="solid"/>
+                      <a:round/>
+                      <a:headEnd type="none" w="med" len="med"/>
+                      <a:tailEnd type="none" w="med" len="med"/>
+                    </a:lnB>
+                  </a:tcPr>
+                </a:tc>
+                <a:tc>
+                  <a:txBody>
+                    <a:bodyPr/>
+                    <a:lstStyle/>
+                    <a:p>
+                      <a:pPr algn="ctr"/>
+                      <a:r>
+                        <a:rPr lang="en-US" sz="3200" b="1" dirty="0" smtClean="0">
+                          <a:solidFill>
+                            <a:schemeClr val="tx1"/>
+                          </a:solidFill>
+                        </a:rPr>
+                        <a:t>O</a:t>
+                      </a:r>
+                      <a:endParaRPr lang="en-US" sz="3200" b="1" dirty="0">
+                        <a:solidFill>
+                          <a:schemeClr val="tx1"/>
+                        </a:solidFill>
+                      </a:endParaRPr>
+                    </a:p>
+                  </a:txBody>
+                  <a:tcPr>
+                    <a:lnL w="12700" cap="flat" cmpd="sng" algn="ctr">
+                      <a:solidFill>
+                        <a:schemeClr val="tx1"/>
+                      </a:solidFill>
+                      <a:prstDash val="solid"/>
+                      <a:round/>
+                      <a:headEnd type="none" w="med" len="med"/>
+                      <a:tailEnd type="none" w="med" len="med"/>
+                    </a:lnL>
+                    <a:lnR w="12700" cap="flat" cmpd="sng" algn="ctr">
+                      <a:solidFill>
+                        <a:schemeClr val="tx1"/>
+                      </a:solidFill>
+                      <a:prstDash val="solid"/>
+                      <a:round/>
+                      <a:headEnd type="none" w="med" len="med"/>
+                      <a:tailEnd type="none" w="med" len="med"/>
+                    </a:lnR>
+                    <a:lnT w="12700" cap="flat" cmpd="sng" algn="ctr">
+                      <a:solidFill>
+                        <a:schemeClr val="tx1"/>
+                      </a:solidFill>
+                      <a:prstDash val="solid"/>
+                      <a:round/>
+                      <a:headEnd type="none" w="med" len="med"/>
+                      <a:tailEnd type="none" w="med" len="med"/>
+                    </a:lnT>
+                    <a:lnB w="12700" cap="flat" cmpd="sng" algn="ctr">
+                      <a:solidFill>
+                        <a:schemeClr val="tx1"/>
+                      </a:solidFill>
+                      <a:prstDash val="solid"/>
+                      <a:round/>
+                      <a:headEnd type="none" w="med" len="med"/>
+                      <a:tailEnd type="none" w="med" len="med"/>
+                    </a:lnB>
+                  </a:tcPr>
+                </a:tc>
+                <a:tc>
+                  <a:txBody>
+                    <a:bodyPr/>
+                    <a:lstStyle/>
+                    <a:p>
+                      <a:pPr algn="ctr"/>
+                      <a:r>
+                        <a:rPr lang="en-US" sz="3200" b="1" dirty="0" smtClean="0"/>
+                        <a:t>M</a:t>
+                      </a:r>
+                      <a:endParaRPr lang="en-US" sz="3200" b="1" dirty="0"/>
+                    </a:p>
+                  </a:txBody>
+                  <a:tcPr>
+                    <a:lnL w="12700" cap="flat" cmpd="sng" algn="ctr">
+                      <a:solidFill>
+                        <a:schemeClr val="tx1"/>
+                      </a:solidFill>
+                      <a:prstDash val="solid"/>
+                      <a:round/>
+                      <a:headEnd type="none" w="med" len="med"/>
+                      <a:tailEnd type="none" w="med" len="med"/>
+                    </a:lnL>
+                    <a:lnR w="12700" cap="flat" cmpd="sng" algn="ctr">
+                      <a:solidFill>
+                        <a:schemeClr val="tx1"/>
+                      </a:solidFill>
+                      <a:prstDash val="solid"/>
+                      <a:round/>
+                      <a:headEnd type="none" w="med" len="med"/>
+                      <a:tailEnd type="none" w="med" len="med"/>
+                    </a:lnR>
+                    <a:lnT w="12700" cap="flat" cmpd="sng" algn="ctr">
+                      <a:solidFill>
+                        <a:schemeClr val="tx1"/>
+                      </a:solidFill>
+                      <a:prstDash val="solid"/>
+                      <a:round/>
+                      <a:headEnd type="none" w="med" len="med"/>
+                      <a:tailEnd type="none" w="med" len="med"/>
+                    </a:lnT>
+                    <a:lnB w="12700" cap="flat" cmpd="sng" algn="ctr">
+                      <a:solidFill>
+                        <a:schemeClr val="tx1"/>
+                      </a:solidFill>
+                      <a:prstDash val="solid"/>
+                      <a:round/>
+                      <a:headEnd type="none" w="med" len="med"/>
+                      <a:tailEnd type="none" w="med" len="med"/>
+                    </a:lnB>
+                  </a:tcPr>
+                </a:tc>
+                <a:tc>
+                  <a:txBody>
+                    <a:bodyPr/>
+                    <a:lstStyle/>
+                    <a:p>
+                      <a:pPr algn="ctr"/>
+                      <a:r>
+                        <a:rPr lang="en-US" sz="3200" b="1" dirty="0" smtClean="0">
+                          <a:solidFill>
+                            <a:srgbClr val="FF0000"/>
+                          </a:solidFill>
+                        </a:rPr>
+                        <a:t>M</a:t>
+                      </a:r>
+                      <a:endParaRPr lang="en-US" sz="3200" b="1" dirty="0">
+                        <a:solidFill>
+                          <a:srgbClr val="FF0000"/>
+                        </a:solidFill>
+                      </a:endParaRPr>
+                    </a:p>
+                  </a:txBody>
+                  <a:tcPr>
+                    <a:lnL w="12700" cap="flat" cmpd="sng" algn="ctr">
+                      <a:solidFill>
+                        <a:schemeClr val="tx1"/>
+                      </a:solidFill>
+                      <a:prstDash val="solid"/>
+                      <a:round/>
+                      <a:headEnd type="none" w="med" len="med"/>
+                      <a:tailEnd type="none" w="med" len="med"/>
+                    </a:lnL>
+                    <a:lnR w="12700" cap="flat" cmpd="sng" algn="ctr">
+                      <a:solidFill>
+                        <a:schemeClr val="tx1"/>
+                      </a:solidFill>
+                      <a:prstDash val="solid"/>
+                      <a:round/>
+                      <a:headEnd type="none" w="med" len="med"/>
+                      <a:tailEnd type="none" w="med" len="med"/>
+                    </a:lnR>
+                    <a:lnT w="12700" cap="flat" cmpd="sng" algn="ctr">
+                      <a:solidFill>
+                        <a:schemeClr val="tx1"/>
+                      </a:solidFill>
+                      <a:prstDash val="solid"/>
+                      <a:round/>
+                      <a:headEnd type="none" w="med" len="med"/>
+                      <a:tailEnd type="none" w="med" len="med"/>
+                    </a:lnT>
+                    <a:lnB w="12700" cap="flat" cmpd="sng" algn="ctr">
+                      <a:solidFill>
+                        <a:schemeClr val="tx1"/>
+                      </a:solidFill>
+                      <a:prstDash val="solid"/>
+                      <a:round/>
+                      <a:headEnd type="none" w="med" len="med"/>
+                      <a:tailEnd type="none" w="med" len="med"/>
+                    </a:lnB>
+                  </a:tcPr>
+                </a:tc>
+                <a:tc>
+                  <a:txBody>
+                    <a:bodyPr/>
+                    <a:lstStyle/>
+                    <a:p>
+                      <a:pPr algn="ctr"/>
+                      <a:r>
+                        <a:rPr lang="en-US" sz="3200" b="1" dirty="0" smtClean="0"/>
+                        <a:t>O</a:t>
+                      </a:r>
+                      <a:endParaRPr lang="en-US" sz="3200" b="1" dirty="0"/>
+                    </a:p>
+                  </a:txBody>
+                  <a:tcPr>
+                    <a:lnL w="12700" cap="flat" cmpd="sng" algn="ctr">
+                      <a:solidFill>
+                        <a:schemeClr val="tx1"/>
+                      </a:solidFill>
+                      <a:prstDash val="solid"/>
+                      <a:round/>
+                      <a:headEnd type="none" w="med" len="med"/>
+                      <a:tailEnd type="none" w="med" len="med"/>
+                    </a:lnL>
+                    <a:lnR w="12700" cap="flat" cmpd="sng" algn="ctr">
+                      <a:solidFill>
+                        <a:schemeClr val="tx1"/>
+                      </a:solidFill>
+                      <a:prstDash val="solid"/>
+                      <a:round/>
+                      <a:headEnd type="none" w="med" len="med"/>
+                      <a:tailEnd type="none" w="med" len="med"/>
+                    </a:lnR>
+                    <a:lnT w="12700" cap="flat" cmpd="sng" algn="ctr">
+                      <a:solidFill>
+                        <a:schemeClr val="tx1"/>
+                      </a:solidFill>
+                      <a:prstDash val="solid"/>
+                      <a:round/>
+                      <a:headEnd type="none" w="med" len="med"/>
+                      <a:tailEnd type="none" w="med" len="med"/>
+                    </a:lnT>
+                    <a:lnB w="12700" cap="flat" cmpd="sng" algn="ctr">
+                      <a:solidFill>
+                        <a:schemeClr val="tx1"/>
+                      </a:solidFill>
+                      <a:prstDash val="solid"/>
+                      <a:round/>
+                      <a:headEnd type="none" w="med" len="med"/>
+                      <a:tailEnd type="none" w="med" len="med"/>
+                    </a:lnB>
+                  </a:tcPr>
+                </a:tc>
+                <a:tc>
+                  <a:txBody>
+                    <a:bodyPr/>
+                    <a:lstStyle/>
+                    <a:p>
+                      <a:pPr algn="ctr"/>
+                      <a:r>
+                        <a:rPr lang="en-US" sz="3200" b="1" dirty="0" smtClean="0"/>
+                        <a:t>O</a:t>
+                      </a:r>
+                      <a:endParaRPr lang="en-US" sz="3200" b="1" dirty="0"/>
+                    </a:p>
+                  </a:txBody>
+                  <a:tcPr>
+                    <a:lnL w="12700" cap="flat" cmpd="sng" algn="ctr">
+                      <a:solidFill>
+                        <a:schemeClr val="tx1"/>
+                      </a:solidFill>
+                      <a:prstDash val="solid"/>
+                      <a:round/>
+                      <a:headEnd type="none" w="med" len="med"/>
+                      <a:tailEnd type="none" w="med" len="med"/>
+                    </a:lnL>
+                    <a:lnR w="12700" cap="flat" cmpd="sng" algn="ctr">
+                      <a:solidFill>
+                        <a:schemeClr val="tx1"/>
+                      </a:solidFill>
+                      <a:prstDash val="solid"/>
+                      <a:round/>
+                      <a:headEnd type="none" w="med" len="med"/>
+                      <a:tailEnd type="none" w="med" len="med"/>
+                    </a:lnR>
+                    <a:lnT w="12700" cap="flat" cmpd="sng" algn="ctr">
+                      <a:solidFill>
+                        <a:schemeClr val="tx1"/>
+                      </a:solidFill>
+                      <a:prstDash val="solid"/>
+                      <a:round/>
+                      <a:headEnd type="none" w="med" len="med"/>
+                      <a:tailEnd type="none" w="med" len="med"/>
+                    </a:lnT>
+                    <a:lnB w="12700" cap="flat" cmpd="sng" algn="ctr">
+                      <a:solidFill>
+                        <a:schemeClr val="tx1"/>
+                      </a:solidFill>
+                      <a:prstDash val="solid"/>
+                      <a:round/>
+                      <a:headEnd type="none" w="med" len="med"/>
+                      <a:tailEnd type="none" w="med" len="med"/>
+                    </a:lnB>
+                  </a:tcPr>
+                </a:tc>
+                <a:tc>
+                  <a:txBody>
+                    <a:bodyPr/>
+                    <a:lstStyle/>
+                    <a:p>
+                      <a:pPr algn="ctr"/>
+                      <a:r>
+                        <a:rPr lang="en-US" sz="3200" b="1" dirty="0" smtClean="0"/>
+                        <a:t>M</a:t>
+                      </a:r>
+                      <a:endParaRPr lang="en-US" sz="3200" b="1" dirty="0"/>
+                    </a:p>
+                  </a:txBody>
+                  <a:tcPr>
+                    <a:lnL w="12700" cap="flat" cmpd="sng" algn="ctr">
+                      <a:solidFill>
+                        <a:schemeClr val="tx1"/>
+                      </a:solidFill>
+                      <a:prstDash val="solid"/>
+                      <a:round/>
+                      <a:headEnd type="none" w="med" len="med"/>
+                      <a:tailEnd type="none" w="med" len="med"/>
+                    </a:lnL>
+                    <a:lnR w="12700" cap="flat" cmpd="sng" algn="ctr">
+                      <a:solidFill>
+                        <a:schemeClr val="tx1"/>
+                      </a:solidFill>
+                      <a:prstDash val="solid"/>
+                      <a:round/>
+                      <a:headEnd type="none" w="med" len="med"/>
+                      <a:tailEnd type="none" w="med" len="med"/>
+                    </a:lnR>
+                    <a:lnT w="12700" cap="flat" cmpd="sng" algn="ctr">
+                      <a:solidFill>
+                        <a:schemeClr val="tx1"/>
+                      </a:solidFill>
+                      <a:prstDash val="solid"/>
+                      <a:round/>
+                      <a:headEnd type="none" w="med" len="med"/>
+                      <a:tailEnd type="none" w="med" len="med"/>
+                    </a:lnT>
+                    <a:lnB w="12700" cap="flat" cmpd="sng" algn="ctr">
+                      <a:solidFill>
+                        <a:schemeClr val="tx1"/>
+                      </a:solidFill>
+                      <a:prstDash val="solid"/>
+                      <a:round/>
+                      <a:headEnd type="none" w="med" len="med"/>
+                      <a:tailEnd type="none" w="med" len="med"/>
+                    </a:lnB>
+                  </a:tcPr>
+                </a:tc>
+                <a:tc>
+                  <a:txBody>
+                    <a:bodyPr/>
+                    <a:lstStyle/>
+                    <a:p>
+                      <a:pPr algn="ctr"/>
+                      <a:r>
+                        <a:rPr lang="en-US" sz="3200" b="1" dirty="0" smtClean="0"/>
+                        <a:t>M</a:t>
+                      </a:r>
+                      <a:endParaRPr lang="en-US" sz="3200" b="1" dirty="0"/>
+                    </a:p>
+                  </a:txBody>
+                  <a:tcPr>
+                    <a:lnL w="12700" cap="flat" cmpd="sng" algn="ctr">
+                      <a:solidFill>
+                        <a:schemeClr val="tx1"/>
+                      </a:solidFill>
+                      <a:prstDash val="solid"/>
+                      <a:round/>
+                      <a:headEnd type="none" w="med" len="med"/>
+                      <a:tailEnd type="none" w="med" len="med"/>
+                    </a:lnL>
+                    <a:lnR w="12700" cap="flat" cmpd="sng" algn="ctr">
+                      <a:solidFill>
+                        <a:schemeClr val="tx1"/>
+                      </a:solidFill>
+                      <a:prstDash val="solid"/>
+                      <a:round/>
+                      <a:headEnd type="none" w="med" len="med"/>
+                      <a:tailEnd type="none" w="med" len="med"/>
+                    </a:lnR>
+                    <a:lnT w="12700" cap="flat" cmpd="sng" algn="ctr">
+                      <a:solidFill>
+                        <a:schemeClr val="tx1"/>
+                      </a:solidFill>
+                      <a:prstDash val="solid"/>
+                      <a:round/>
+                      <a:headEnd type="none" w="med" len="med"/>
+                      <a:tailEnd type="none" w="med" len="med"/>
+                    </a:lnT>
+                    <a:lnB w="12700" cap="flat" cmpd="sng" algn="ctr">
+                      <a:solidFill>
+                        <a:schemeClr val="tx1"/>
+                      </a:solidFill>
+                      <a:prstDash val="solid"/>
+                      <a:round/>
+                      <a:headEnd type="none" w="med" len="med"/>
+                      <a:tailEnd type="none" w="med" len="med"/>
+                    </a:lnB>
+                  </a:tcPr>
+                </a:tc>
+              </a:tr>
+            </a:tbl>
+          </a:graphicData>
+        </a:graphic>
+      </p:graphicFrame>
+      <p:graphicFrame>
+        <p:nvGraphicFramePr>
+          <p:cNvPr id="10" name="Table 9"/>
+          <p:cNvGraphicFramePr>
+            <a:graphicFrameLocks noGrp="1"/>
+          </p:cNvGraphicFramePr>
+          <p:nvPr>
+            <p:extLst>
+              <p:ext uri="{D42A27DB-BD31-4B8C-83A1-F6EECF244321}">
+                <p14:modId xmlns:p14="http://schemas.microsoft.com/office/powerpoint/2010/main" val="22353980"/>
+              </p:ext>
+            </p:extLst>
+          </p:nvPr>
+        </p:nvGraphicFramePr>
+        <p:xfrm>
+          <a:off x="2903930" y="2476012"/>
+          <a:ext cx="6502400" cy="579120"/>
+        </p:xfrm>
+        <a:graphic>
+          <a:graphicData uri="http://schemas.openxmlformats.org/drawingml/2006/table">
+            <a:tbl>
+              <a:tblPr>
+                <a:tableStyleId>{5C22544A-7EE6-4342-B048-85BDC9FD1C3A}</a:tableStyleId>
+              </a:tblPr>
+              <a:tblGrid>
+                <a:gridCol w="812800"/>
+                <a:gridCol w="812800"/>
+                <a:gridCol w="812800"/>
+                <a:gridCol w="812800"/>
+                <a:gridCol w="812800"/>
+                <a:gridCol w="812800"/>
+                <a:gridCol w="812800"/>
+                <a:gridCol w="812800"/>
+              </a:tblGrid>
+              <a:tr h="370840">
+                <a:tc>
+                  <a:txBody>
+                    <a:bodyPr/>
+                    <a:lstStyle/>
+                    <a:p>
+                      <a:pPr algn="ctr"/>
+                      <a:r>
+                        <a:rPr lang="en-US" sz="3200" b="1" dirty="0" smtClean="0"/>
+                        <a:t>M</a:t>
+                      </a:r>
+                      <a:endParaRPr lang="en-US" sz="3200" b="1" dirty="0"/>
+                    </a:p>
+                  </a:txBody>
+                  <a:tcPr>
+                    <a:lnL w="12700" cap="flat" cmpd="sng" algn="ctr">
+                      <a:solidFill>
+                        <a:schemeClr val="tx1"/>
+                      </a:solidFill>
+                      <a:prstDash val="solid"/>
+                      <a:round/>
+                      <a:headEnd type="none" w="med" len="med"/>
+                      <a:tailEnd type="none" w="med" len="med"/>
+                    </a:lnL>
+                    <a:lnR w="12700" cap="flat" cmpd="sng" algn="ctr">
+                      <a:solidFill>
+                        <a:schemeClr val="tx1"/>
+                      </a:solidFill>
+                      <a:prstDash val="solid"/>
+                      <a:round/>
+                      <a:headEnd type="none" w="med" len="med"/>
+                      <a:tailEnd type="none" w="med" len="med"/>
+                    </a:lnR>
+                    <a:lnT w="12700" cap="flat" cmpd="sng" algn="ctr">
+                      <a:solidFill>
+                        <a:schemeClr val="tx1"/>
+                      </a:solidFill>
+                      <a:prstDash val="solid"/>
+                      <a:round/>
+                      <a:headEnd type="none" w="med" len="med"/>
+                      <a:tailEnd type="none" w="med" len="med"/>
+                    </a:lnT>
+                    <a:lnB w="12700" cap="flat" cmpd="sng" algn="ctr">
+                      <a:solidFill>
+                        <a:schemeClr val="tx1"/>
+                      </a:solidFill>
+                      <a:prstDash val="solid"/>
+                      <a:round/>
+                      <a:headEnd type="none" w="med" len="med"/>
+                      <a:tailEnd type="none" w="med" len="med"/>
+                    </a:lnB>
+                  </a:tcPr>
+                </a:tc>
+                <a:tc>
+                  <a:txBody>
+                    <a:bodyPr/>
+                    <a:lstStyle/>
+                    <a:p>
+                      <a:pPr algn="ctr"/>
+                      <a:r>
+                        <a:rPr lang="en-US" sz="3200" b="1" dirty="0" smtClean="0">
+                          <a:solidFill>
+                            <a:schemeClr val="tx1"/>
+                          </a:solidFill>
+                        </a:rPr>
+                        <a:t>M</a:t>
+                      </a:r>
+                      <a:endParaRPr lang="en-US" sz="3200" b="1" dirty="0">
+                        <a:solidFill>
+                          <a:schemeClr val="tx1"/>
+                        </a:solidFill>
+                      </a:endParaRPr>
+                    </a:p>
+                  </a:txBody>
+                  <a:tcPr>
+                    <a:lnL w="12700" cap="flat" cmpd="sng" algn="ctr">
+                      <a:solidFill>
+                        <a:schemeClr val="tx1"/>
+                      </a:solidFill>
+                      <a:prstDash val="solid"/>
+                      <a:round/>
+                      <a:headEnd type="none" w="med" len="med"/>
+                      <a:tailEnd type="none" w="med" len="med"/>
+                    </a:lnL>
+                    <a:lnR w="12700" cap="flat" cmpd="sng" algn="ctr">
+                      <a:solidFill>
+                        <a:schemeClr val="tx1"/>
+                      </a:solidFill>
+                      <a:prstDash val="solid"/>
+                      <a:round/>
+                      <a:headEnd type="none" w="med" len="med"/>
+                      <a:tailEnd type="none" w="med" len="med"/>
+                    </a:lnR>
+                    <a:lnT w="12700" cap="flat" cmpd="sng" algn="ctr">
+                      <a:solidFill>
+                        <a:schemeClr val="tx1"/>
+                      </a:solidFill>
+                      <a:prstDash val="solid"/>
+                      <a:round/>
+                      <a:headEnd type="none" w="med" len="med"/>
+                      <a:tailEnd type="none" w="med" len="med"/>
+                    </a:lnT>
+                    <a:lnB w="12700" cap="flat" cmpd="sng" algn="ctr">
+                      <a:solidFill>
+                        <a:schemeClr val="tx1"/>
+                      </a:solidFill>
+                      <a:prstDash val="solid"/>
+                      <a:round/>
+                      <a:headEnd type="none" w="med" len="med"/>
+                      <a:tailEnd type="none" w="med" len="med"/>
+                    </a:lnB>
+                  </a:tcPr>
+                </a:tc>
+                <a:tc>
+                  <a:txBody>
+                    <a:bodyPr/>
+                    <a:lstStyle/>
+                    <a:p>
+                      <a:pPr algn="ctr"/>
+                      <a:r>
+                        <a:rPr lang="en-US" sz="3200" b="1" dirty="0" smtClean="0"/>
+                        <a:t>M</a:t>
+                      </a:r>
+                      <a:endParaRPr lang="en-US" sz="3200" b="1" dirty="0"/>
+                    </a:p>
+                  </a:txBody>
+                  <a:tcPr>
+                    <a:lnL w="12700" cap="flat" cmpd="sng" algn="ctr">
+                      <a:solidFill>
+                        <a:schemeClr val="tx1"/>
+                      </a:solidFill>
+                      <a:prstDash val="solid"/>
+                      <a:round/>
+                      <a:headEnd type="none" w="med" len="med"/>
+                      <a:tailEnd type="none" w="med" len="med"/>
+                    </a:lnL>
+                    <a:lnR w="12700" cap="flat" cmpd="sng" algn="ctr">
+                      <a:solidFill>
+                        <a:schemeClr val="tx1"/>
+                      </a:solidFill>
+                      <a:prstDash val="solid"/>
+                      <a:round/>
+                      <a:headEnd type="none" w="med" len="med"/>
+                      <a:tailEnd type="none" w="med" len="med"/>
+                    </a:lnR>
+                    <a:lnT w="12700" cap="flat" cmpd="sng" algn="ctr">
+                      <a:solidFill>
+                        <a:schemeClr val="tx1"/>
+                      </a:solidFill>
+                      <a:prstDash val="solid"/>
+                      <a:round/>
+                      <a:headEnd type="none" w="med" len="med"/>
+                      <a:tailEnd type="none" w="med" len="med"/>
+                    </a:lnT>
+                    <a:lnB w="12700" cap="flat" cmpd="sng" algn="ctr">
+                      <a:solidFill>
+                        <a:schemeClr val="tx1"/>
+                      </a:solidFill>
+                      <a:prstDash val="solid"/>
+                      <a:round/>
+                      <a:headEnd type="none" w="med" len="med"/>
+                      <a:tailEnd type="none" w="med" len="med"/>
+                    </a:lnB>
+                  </a:tcPr>
+                </a:tc>
+                <a:tc>
+                  <a:txBody>
+                    <a:bodyPr/>
+                    <a:lstStyle/>
+                    <a:p>
+                      <a:pPr algn="ctr"/>
+                      <a:r>
+                        <a:rPr lang="en-US" sz="3200" b="1" dirty="0" smtClean="0">
+                          <a:solidFill>
+                            <a:schemeClr val="tx1"/>
+                          </a:solidFill>
+                        </a:rPr>
+                        <a:t>M</a:t>
+                      </a:r>
+                      <a:endParaRPr lang="en-US" sz="3200" b="1" dirty="0">
+                        <a:solidFill>
+                          <a:schemeClr val="tx1"/>
+                        </a:solidFill>
+                      </a:endParaRPr>
+                    </a:p>
+                  </a:txBody>
+                  <a:tcPr>
+                    <a:lnL w="12700" cap="flat" cmpd="sng" algn="ctr">
+                      <a:solidFill>
+                        <a:schemeClr val="tx1"/>
+                      </a:solidFill>
+                      <a:prstDash val="solid"/>
+                      <a:round/>
+                      <a:headEnd type="none" w="med" len="med"/>
+                      <a:tailEnd type="none" w="med" len="med"/>
+                    </a:lnL>
+                    <a:lnR w="12700" cap="flat" cmpd="sng" algn="ctr">
+                      <a:solidFill>
+                        <a:schemeClr val="tx1"/>
+                      </a:solidFill>
+                      <a:prstDash val="solid"/>
+                      <a:round/>
+                      <a:headEnd type="none" w="med" len="med"/>
+                      <a:tailEnd type="none" w="med" len="med"/>
+                    </a:lnR>
+                    <a:lnT w="12700" cap="flat" cmpd="sng" algn="ctr">
+                      <a:solidFill>
+                        <a:schemeClr val="tx1"/>
+                      </a:solidFill>
+                      <a:prstDash val="solid"/>
+                      <a:round/>
+                      <a:headEnd type="none" w="med" len="med"/>
+                      <a:tailEnd type="none" w="med" len="med"/>
+                    </a:lnT>
+                    <a:lnB w="12700" cap="flat" cmpd="sng" algn="ctr">
+                      <a:solidFill>
+                        <a:schemeClr val="tx1"/>
+                      </a:solidFill>
+                      <a:prstDash val="solid"/>
+                      <a:round/>
+                      <a:headEnd type="none" w="med" len="med"/>
+                      <a:tailEnd type="none" w="med" len="med"/>
+                    </a:lnB>
+                  </a:tcPr>
+                </a:tc>
+                <a:tc>
+                  <a:txBody>
+                    <a:bodyPr/>
+                    <a:lstStyle/>
+                    <a:p>
+                      <a:pPr algn="ctr"/>
+                      <a:r>
+                        <a:rPr lang="en-US" sz="3200" b="1" dirty="0" smtClean="0"/>
+                        <a:t>M</a:t>
+                      </a:r>
+                      <a:endParaRPr lang="en-US" sz="3200" b="1" dirty="0"/>
+                    </a:p>
+                  </a:txBody>
+                  <a:tcPr>
+                    <a:lnL w="12700" cap="flat" cmpd="sng" algn="ctr">
+                      <a:solidFill>
+                        <a:schemeClr val="tx1"/>
+                      </a:solidFill>
+                      <a:prstDash val="solid"/>
+                      <a:round/>
+                      <a:headEnd type="none" w="med" len="med"/>
+                      <a:tailEnd type="none" w="med" len="med"/>
+                    </a:lnL>
+                    <a:lnR w="12700" cap="flat" cmpd="sng" algn="ctr">
+                      <a:solidFill>
+                        <a:schemeClr val="tx1"/>
+                      </a:solidFill>
+                      <a:prstDash val="solid"/>
+                      <a:round/>
+                      <a:headEnd type="none" w="med" len="med"/>
+                      <a:tailEnd type="none" w="med" len="med"/>
+                    </a:lnR>
+                    <a:lnT w="12700" cap="flat" cmpd="sng" algn="ctr">
+                      <a:solidFill>
+                        <a:schemeClr val="tx1"/>
+                      </a:solidFill>
+                      <a:prstDash val="solid"/>
+                      <a:round/>
+                      <a:headEnd type="none" w="med" len="med"/>
+                      <a:tailEnd type="none" w="med" len="med"/>
+                    </a:lnT>
+                    <a:lnB w="12700" cap="flat" cmpd="sng" algn="ctr">
+                      <a:solidFill>
+                        <a:schemeClr val="tx1"/>
+                      </a:solidFill>
+                      <a:prstDash val="solid"/>
+                      <a:round/>
+                      <a:headEnd type="none" w="med" len="med"/>
+                      <a:tailEnd type="none" w="med" len="med"/>
+                    </a:lnB>
+                  </a:tcPr>
+                </a:tc>
+                <a:tc>
+                  <a:txBody>
+                    <a:bodyPr/>
+                    <a:lstStyle/>
+                    <a:p>
+                      <a:pPr algn="ctr"/>
+                      <a:r>
+                        <a:rPr lang="en-US" sz="3200" b="1" dirty="0" smtClean="0"/>
+                        <a:t>O</a:t>
+                      </a:r>
+                      <a:endParaRPr lang="en-US" sz="3200" b="1" dirty="0"/>
+                    </a:p>
+                  </a:txBody>
+                  <a:tcPr>
+                    <a:lnL w="12700" cap="flat" cmpd="sng" algn="ctr">
+                      <a:solidFill>
+                        <a:schemeClr val="tx1"/>
+                      </a:solidFill>
+                      <a:prstDash val="solid"/>
+                      <a:round/>
+                      <a:headEnd type="none" w="med" len="med"/>
+                      <a:tailEnd type="none" w="med" len="med"/>
+                    </a:lnL>
+                    <a:lnR w="12700" cap="flat" cmpd="sng" algn="ctr">
+                      <a:solidFill>
+                        <a:schemeClr val="tx1"/>
+                      </a:solidFill>
+                      <a:prstDash val="solid"/>
+                      <a:round/>
+                      <a:headEnd type="none" w="med" len="med"/>
+                      <a:tailEnd type="none" w="med" len="med"/>
+                    </a:lnR>
+                    <a:lnT w="12700" cap="flat" cmpd="sng" algn="ctr">
+                      <a:solidFill>
+                        <a:schemeClr val="tx1"/>
+                      </a:solidFill>
+                      <a:prstDash val="solid"/>
+                      <a:round/>
+                      <a:headEnd type="none" w="med" len="med"/>
+                      <a:tailEnd type="none" w="med" len="med"/>
+                    </a:lnT>
+                    <a:lnB w="12700" cap="flat" cmpd="sng" algn="ctr">
+                      <a:solidFill>
+                        <a:schemeClr val="tx1"/>
+                      </a:solidFill>
+                      <a:prstDash val="solid"/>
+                      <a:round/>
+                      <a:headEnd type="none" w="med" len="med"/>
+                      <a:tailEnd type="none" w="med" len="med"/>
+                    </a:lnB>
+                  </a:tcPr>
+                </a:tc>
+                <a:tc>
+                  <a:txBody>
+                    <a:bodyPr/>
+                    <a:lstStyle/>
+                    <a:p>
+                      <a:pPr algn="ctr"/>
+                      <a:r>
+                        <a:rPr lang="en-US" sz="3200" b="1" dirty="0" smtClean="0"/>
+                        <a:t>O</a:t>
+                      </a:r>
+                      <a:endParaRPr lang="en-US" sz="3200" b="1" dirty="0"/>
+                    </a:p>
+                  </a:txBody>
+                  <a:tcPr>
+                    <a:lnL w="12700" cap="flat" cmpd="sng" algn="ctr">
+                      <a:solidFill>
+                        <a:schemeClr val="tx1"/>
+                      </a:solidFill>
+                      <a:prstDash val="solid"/>
+                      <a:round/>
+                      <a:headEnd type="none" w="med" len="med"/>
+                      <a:tailEnd type="none" w="med" len="med"/>
+                    </a:lnL>
+                    <a:lnR w="12700" cap="flat" cmpd="sng" algn="ctr">
+                      <a:solidFill>
+                        <a:schemeClr val="tx1"/>
+                      </a:solidFill>
+                      <a:prstDash val="solid"/>
+                      <a:round/>
+                      <a:headEnd type="none" w="med" len="med"/>
+                      <a:tailEnd type="none" w="med" len="med"/>
+                    </a:lnR>
+                    <a:lnT w="12700" cap="flat" cmpd="sng" algn="ctr">
+                      <a:solidFill>
+                        <a:schemeClr val="tx1"/>
+                      </a:solidFill>
+                      <a:prstDash val="solid"/>
+                      <a:round/>
+                      <a:headEnd type="none" w="med" len="med"/>
+                      <a:tailEnd type="none" w="med" len="med"/>
+                    </a:lnT>
+                    <a:lnB w="12700" cap="flat" cmpd="sng" algn="ctr">
+                      <a:solidFill>
+                        <a:schemeClr val="tx1"/>
+                      </a:solidFill>
+                      <a:prstDash val="solid"/>
+                      <a:round/>
+                      <a:headEnd type="none" w="med" len="med"/>
+                      <a:tailEnd type="none" w="med" len="med"/>
+                    </a:lnB>
+                  </a:tcPr>
+                </a:tc>
+                <a:tc>
+                  <a:txBody>
+                    <a:bodyPr/>
+                    <a:lstStyle/>
+                    <a:p>
+                      <a:pPr algn="ctr"/>
+                      <a:r>
+                        <a:rPr lang="en-US" sz="3200" b="1" dirty="0" smtClean="0"/>
+                        <a:t>O</a:t>
+                      </a:r>
+                      <a:endParaRPr lang="en-US" sz="3200" b="1" dirty="0"/>
+                    </a:p>
+                  </a:txBody>
+                  <a:tcPr>
+                    <a:lnL w="12700" cap="flat" cmpd="sng" algn="ctr">
+                      <a:solidFill>
+                        <a:schemeClr val="tx1"/>
+                      </a:solidFill>
+                      <a:prstDash val="solid"/>
+                      <a:round/>
+                      <a:headEnd type="none" w="med" len="med"/>
+                      <a:tailEnd type="none" w="med" len="med"/>
+                    </a:lnL>
+                    <a:lnR w="12700" cap="flat" cmpd="sng" algn="ctr">
+                      <a:solidFill>
+                        <a:schemeClr val="tx1"/>
+                      </a:solidFill>
+                      <a:prstDash val="solid"/>
+                      <a:round/>
+                      <a:headEnd type="none" w="med" len="med"/>
+                      <a:tailEnd type="none" w="med" len="med"/>
+                    </a:lnR>
+                    <a:lnT w="12700" cap="flat" cmpd="sng" algn="ctr">
+                      <a:solidFill>
+                        <a:schemeClr val="tx1"/>
+                      </a:solidFill>
+                      <a:prstDash val="solid"/>
+                      <a:round/>
+                      <a:headEnd type="none" w="med" len="med"/>
+                      <a:tailEnd type="none" w="med" len="med"/>
+                    </a:lnT>
+                    <a:lnB w="12700" cap="flat" cmpd="sng" algn="ctr">
+                      <a:solidFill>
+                        <a:schemeClr val="tx1"/>
+                      </a:solidFill>
+                      <a:prstDash val="solid"/>
+                      <a:round/>
+                      <a:headEnd type="none" w="med" len="med"/>
+                      <a:tailEnd type="none" w="med" len="med"/>
+                    </a:lnB>
+                  </a:tcPr>
+                </a:tc>
+              </a:tr>
+            </a:tbl>
+          </a:graphicData>
+        </a:graphic>
+      </p:graphicFrame>
+      <p:graphicFrame>
+        <p:nvGraphicFramePr>
+          <p:cNvPr id="11" name="Table 10"/>
+          <p:cNvGraphicFramePr>
+            <a:graphicFrameLocks noGrp="1"/>
+          </p:cNvGraphicFramePr>
+          <p:nvPr>
+            <p:extLst>
+              <p:ext uri="{D42A27DB-BD31-4B8C-83A1-F6EECF244321}">
+                <p14:modId xmlns:p14="http://schemas.microsoft.com/office/powerpoint/2010/main" val="1564723263"/>
+              </p:ext>
+            </p:extLst>
+          </p:nvPr>
+        </p:nvGraphicFramePr>
+        <p:xfrm>
+          <a:off x="2921420" y="3243007"/>
+          <a:ext cx="6502400" cy="579120"/>
+        </p:xfrm>
+        <a:graphic>
+          <a:graphicData uri="http://schemas.openxmlformats.org/drawingml/2006/table">
+            <a:tbl>
+              <a:tblPr>
+                <a:tableStyleId>{5C22544A-7EE6-4342-B048-85BDC9FD1C3A}</a:tableStyleId>
+              </a:tblPr>
+              <a:tblGrid>
+                <a:gridCol w="812800"/>
+                <a:gridCol w="812800"/>
+                <a:gridCol w="812800"/>
+                <a:gridCol w="812800"/>
+                <a:gridCol w="812800"/>
+                <a:gridCol w="812800"/>
+                <a:gridCol w="812800"/>
+                <a:gridCol w="812800"/>
+              </a:tblGrid>
+              <a:tr h="370840">
+                <a:tc>
+                  <a:txBody>
+                    <a:bodyPr/>
+                    <a:lstStyle/>
+                    <a:p>
+                      <a:pPr algn="ctr"/>
+                      <a:r>
+                        <a:rPr lang="en-US" sz="3200" b="1" dirty="0" smtClean="0"/>
+                        <a:t>O</a:t>
+                      </a:r>
+                      <a:endParaRPr lang="en-US" sz="3200" b="1" dirty="0"/>
+                    </a:p>
+                  </a:txBody>
+                  <a:tcPr>
+                    <a:lnL w="12700" cap="flat" cmpd="sng" algn="ctr">
+                      <a:solidFill>
+                        <a:schemeClr val="tx1"/>
+                      </a:solidFill>
+                      <a:prstDash val="solid"/>
+                      <a:round/>
+                      <a:headEnd type="none" w="med" len="med"/>
+                      <a:tailEnd type="none" w="med" len="med"/>
+                    </a:lnL>
+                    <a:lnR w="12700" cap="flat" cmpd="sng" algn="ctr">
+                      <a:solidFill>
+                        <a:schemeClr val="tx1"/>
+                      </a:solidFill>
+                      <a:prstDash val="solid"/>
+                      <a:round/>
+                      <a:headEnd type="none" w="med" len="med"/>
+                      <a:tailEnd type="none" w="med" len="med"/>
+                    </a:lnR>
+                    <a:lnT w="12700" cap="flat" cmpd="sng" algn="ctr">
+                      <a:solidFill>
+                        <a:schemeClr val="tx1"/>
+                      </a:solidFill>
+                      <a:prstDash val="solid"/>
+                      <a:round/>
+                      <a:headEnd type="none" w="med" len="med"/>
+                      <a:tailEnd type="none" w="med" len="med"/>
+                    </a:lnT>
+                    <a:lnB w="12700" cap="flat" cmpd="sng" algn="ctr">
+                      <a:solidFill>
+                        <a:schemeClr val="tx1"/>
+                      </a:solidFill>
+                      <a:prstDash val="solid"/>
+                      <a:round/>
+                      <a:headEnd type="none" w="med" len="med"/>
+                      <a:tailEnd type="none" w="med" len="med"/>
+                    </a:lnB>
+                  </a:tcPr>
+                </a:tc>
+                <a:tc>
+                  <a:txBody>
+                    <a:bodyPr/>
+                    <a:lstStyle/>
+                    <a:p>
+                      <a:pPr algn="ctr"/>
+                      <a:r>
+                        <a:rPr lang="en-US" sz="3200" b="1" dirty="0" smtClean="0">
+                          <a:solidFill>
+                            <a:schemeClr val="tx1"/>
+                          </a:solidFill>
+                        </a:rPr>
+                        <a:t>M</a:t>
+                      </a:r>
+                      <a:endParaRPr lang="en-US" sz="3200" b="1" dirty="0">
+                        <a:solidFill>
+                          <a:schemeClr val="tx1"/>
+                        </a:solidFill>
+                      </a:endParaRPr>
+                    </a:p>
+                  </a:txBody>
+                  <a:tcPr>
+                    <a:lnL w="12700" cap="flat" cmpd="sng" algn="ctr">
+                      <a:solidFill>
+                        <a:schemeClr val="tx1"/>
+                      </a:solidFill>
+                      <a:prstDash val="solid"/>
+                      <a:round/>
+                      <a:headEnd type="none" w="med" len="med"/>
+                      <a:tailEnd type="none" w="med" len="med"/>
+                    </a:lnL>
+                    <a:lnR w="12700" cap="flat" cmpd="sng" algn="ctr">
+                      <a:solidFill>
+                        <a:schemeClr val="tx1"/>
+                      </a:solidFill>
+                      <a:prstDash val="solid"/>
+                      <a:round/>
+                      <a:headEnd type="none" w="med" len="med"/>
+                      <a:tailEnd type="none" w="med" len="med"/>
+                    </a:lnR>
+                    <a:lnT w="12700" cap="flat" cmpd="sng" algn="ctr">
+                      <a:solidFill>
+                        <a:schemeClr val="tx1"/>
+                      </a:solidFill>
+                      <a:prstDash val="solid"/>
+                      <a:round/>
+                      <a:headEnd type="none" w="med" len="med"/>
+                      <a:tailEnd type="none" w="med" len="med"/>
+                    </a:lnT>
+                    <a:lnB w="12700" cap="flat" cmpd="sng" algn="ctr">
+                      <a:solidFill>
+                        <a:schemeClr val="tx1"/>
+                      </a:solidFill>
+                      <a:prstDash val="solid"/>
+                      <a:round/>
+                      <a:headEnd type="none" w="med" len="med"/>
+                      <a:tailEnd type="none" w="med" len="med"/>
+                    </a:lnB>
+                  </a:tcPr>
+                </a:tc>
+                <a:tc>
+                  <a:txBody>
+                    <a:bodyPr/>
+                    <a:lstStyle/>
+                    <a:p>
+                      <a:pPr algn="ctr"/>
+                      <a:r>
+                        <a:rPr lang="en-US" sz="3200" b="1" dirty="0" smtClean="0"/>
+                        <a:t>M</a:t>
+                      </a:r>
+                      <a:endParaRPr lang="en-US" sz="3200" b="1" dirty="0"/>
+                    </a:p>
+                  </a:txBody>
+                  <a:tcPr>
+                    <a:lnL w="12700" cap="flat" cmpd="sng" algn="ctr">
+                      <a:solidFill>
+                        <a:schemeClr val="tx1"/>
+                      </a:solidFill>
+                      <a:prstDash val="solid"/>
+                      <a:round/>
+                      <a:headEnd type="none" w="med" len="med"/>
+                      <a:tailEnd type="none" w="med" len="med"/>
+                    </a:lnL>
+                    <a:lnR w="12700" cap="flat" cmpd="sng" algn="ctr">
+                      <a:solidFill>
+                        <a:schemeClr val="tx1"/>
+                      </a:solidFill>
+                      <a:prstDash val="solid"/>
+                      <a:round/>
+                      <a:headEnd type="none" w="med" len="med"/>
+                      <a:tailEnd type="none" w="med" len="med"/>
+                    </a:lnR>
+                    <a:lnT w="12700" cap="flat" cmpd="sng" algn="ctr">
+                      <a:solidFill>
+                        <a:schemeClr val="tx1"/>
+                      </a:solidFill>
+                      <a:prstDash val="solid"/>
+                      <a:round/>
+                      <a:headEnd type="none" w="med" len="med"/>
+                      <a:tailEnd type="none" w="med" len="med"/>
+                    </a:lnT>
+                    <a:lnB w="12700" cap="flat" cmpd="sng" algn="ctr">
+                      <a:solidFill>
+                        <a:schemeClr val="tx1"/>
+                      </a:solidFill>
+                      <a:prstDash val="solid"/>
+                      <a:round/>
+                      <a:headEnd type="none" w="med" len="med"/>
+                      <a:tailEnd type="none" w="med" len="med"/>
+                    </a:lnB>
+                  </a:tcPr>
+                </a:tc>
+                <a:tc>
+                  <a:txBody>
+                    <a:bodyPr/>
+                    <a:lstStyle/>
+                    <a:p>
+                      <a:pPr algn="ctr"/>
+                      <a:r>
+                        <a:rPr lang="en-US" sz="3200" b="1" dirty="0" smtClean="0">
+                          <a:solidFill>
+                            <a:schemeClr val="tx1"/>
+                          </a:solidFill>
+                        </a:rPr>
+                        <a:t>M</a:t>
+                      </a:r>
+                      <a:endParaRPr lang="en-US" sz="3200" b="1" dirty="0">
+                        <a:solidFill>
+                          <a:schemeClr val="tx1"/>
+                        </a:solidFill>
+                      </a:endParaRPr>
+                    </a:p>
+                  </a:txBody>
+                  <a:tcPr>
+                    <a:lnL w="12700" cap="flat" cmpd="sng" algn="ctr">
+                      <a:solidFill>
+                        <a:schemeClr val="tx1"/>
+                      </a:solidFill>
+                      <a:prstDash val="solid"/>
+                      <a:round/>
+                      <a:headEnd type="none" w="med" len="med"/>
+                      <a:tailEnd type="none" w="med" len="med"/>
+                    </a:lnL>
+                    <a:lnR w="12700" cap="flat" cmpd="sng" algn="ctr">
+                      <a:solidFill>
+                        <a:schemeClr val="tx1"/>
+                      </a:solidFill>
+                      <a:prstDash val="solid"/>
+                      <a:round/>
+                      <a:headEnd type="none" w="med" len="med"/>
+                      <a:tailEnd type="none" w="med" len="med"/>
+                    </a:lnR>
+                    <a:lnT w="12700" cap="flat" cmpd="sng" algn="ctr">
+                      <a:solidFill>
+                        <a:schemeClr val="tx1"/>
+                      </a:solidFill>
+                      <a:prstDash val="solid"/>
+                      <a:round/>
+                      <a:headEnd type="none" w="med" len="med"/>
+                      <a:tailEnd type="none" w="med" len="med"/>
+                    </a:lnT>
+                    <a:lnB w="12700" cap="flat" cmpd="sng" algn="ctr">
+                      <a:solidFill>
+                        <a:schemeClr val="tx1"/>
+                      </a:solidFill>
+                      <a:prstDash val="solid"/>
+                      <a:round/>
+                      <a:headEnd type="none" w="med" len="med"/>
+                      <a:tailEnd type="none" w="med" len="med"/>
+                    </a:lnB>
+                  </a:tcPr>
+                </a:tc>
+                <a:tc>
+                  <a:txBody>
+                    <a:bodyPr/>
+                    <a:lstStyle/>
+                    <a:p>
+                      <a:pPr algn="ctr"/>
+                      <a:r>
+                        <a:rPr lang="en-US" sz="3200" b="1" dirty="0" smtClean="0"/>
+                        <a:t>M</a:t>
+                      </a:r>
+                      <a:endParaRPr lang="en-US" sz="3200" b="1" dirty="0"/>
+                    </a:p>
+                  </a:txBody>
+                  <a:tcPr>
+                    <a:lnL w="12700" cap="flat" cmpd="sng" algn="ctr">
+                      <a:solidFill>
+                        <a:schemeClr val="tx1"/>
+                      </a:solidFill>
+                      <a:prstDash val="solid"/>
+                      <a:round/>
+                      <a:headEnd type="none" w="med" len="med"/>
+                      <a:tailEnd type="none" w="med" len="med"/>
+                    </a:lnL>
+                    <a:lnR w="12700" cap="flat" cmpd="sng" algn="ctr">
+                      <a:solidFill>
+                        <a:schemeClr val="tx1"/>
+                      </a:solidFill>
+                      <a:prstDash val="solid"/>
+                      <a:round/>
+                      <a:headEnd type="none" w="med" len="med"/>
+                      <a:tailEnd type="none" w="med" len="med"/>
+                    </a:lnR>
+                    <a:lnT w="12700" cap="flat" cmpd="sng" algn="ctr">
+                      <a:solidFill>
+                        <a:schemeClr val="tx1"/>
+                      </a:solidFill>
+                      <a:prstDash val="solid"/>
+                      <a:round/>
+                      <a:headEnd type="none" w="med" len="med"/>
+                      <a:tailEnd type="none" w="med" len="med"/>
+                    </a:lnT>
+                    <a:lnB w="12700" cap="flat" cmpd="sng" algn="ctr">
+                      <a:solidFill>
+                        <a:schemeClr val="tx1"/>
+                      </a:solidFill>
+                      <a:prstDash val="solid"/>
+                      <a:round/>
+                      <a:headEnd type="none" w="med" len="med"/>
+                      <a:tailEnd type="none" w="med" len="med"/>
+                    </a:lnB>
+                  </a:tcPr>
+                </a:tc>
+                <a:tc>
+                  <a:txBody>
+                    <a:bodyPr/>
+                    <a:lstStyle/>
+                    <a:p>
+                      <a:pPr algn="ctr"/>
+                      <a:r>
+                        <a:rPr lang="en-US" sz="3200" b="1" dirty="0" smtClean="0"/>
+                        <a:t>M</a:t>
+                      </a:r>
+                      <a:endParaRPr lang="en-US" sz="3200" b="1" dirty="0"/>
+                    </a:p>
+                  </a:txBody>
+                  <a:tcPr>
+                    <a:lnL w="12700" cap="flat" cmpd="sng" algn="ctr">
+                      <a:solidFill>
+                        <a:schemeClr val="tx1"/>
+                      </a:solidFill>
+                      <a:prstDash val="solid"/>
+                      <a:round/>
+                      <a:headEnd type="none" w="med" len="med"/>
+                      <a:tailEnd type="none" w="med" len="med"/>
+                    </a:lnL>
+                    <a:lnR w="12700" cap="flat" cmpd="sng" algn="ctr">
+                      <a:solidFill>
+                        <a:schemeClr val="tx1"/>
+                      </a:solidFill>
+                      <a:prstDash val="solid"/>
+                      <a:round/>
+                      <a:headEnd type="none" w="med" len="med"/>
+                      <a:tailEnd type="none" w="med" len="med"/>
+                    </a:lnR>
+                    <a:lnT w="12700" cap="flat" cmpd="sng" algn="ctr">
+                      <a:solidFill>
+                        <a:schemeClr val="tx1"/>
+                      </a:solidFill>
+                      <a:prstDash val="solid"/>
+                      <a:round/>
+                      <a:headEnd type="none" w="med" len="med"/>
+                      <a:tailEnd type="none" w="med" len="med"/>
+                    </a:lnT>
+                    <a:lnB w="12700" cap="flat" cmpd="sng" algn="ctr">
+                      <a:solidFill>
+                        <a:schemeClr val="tx1"/>
+                      </a:solidFill>
+                      <a:prstDash val="solid"/>
+                      <a:round/>
+                      <a:headEnd type="none" w="med" len="med"/>
+                      <a:tailEnd type="none" w="med" len="med"/>
+                    </a:lnB>
+                  </a:tcPr>
+                </a:tc>
+                <a:tc>
+                  <a:txBody>
+                    <a:bodyPr/>
+                    <a:lstStyle/>
+                    <a:p>
+                      <a:pPr algn="ctr"/>
+                      <a:r>
+                        <a:rPr lang="en-US" sz="3200" b="1" dirty="0" smtClean="0"/>
+                        <a:t>O</a:t>
+                      </a:r>
+                      <a:endParaRPr lang="en-US" sz="3200" b="1" dirty="0"/>
+                    </a:p>
+                  </a:txBody>
+                  <a:tcPr>
+                    <a:lnL w="12700" cap="flat" cmpd="sng" algn="ctr">
+                      <a:solidFill>
+                        <a:schemeClr val="tx1"/>
+                      </a:solidFill>
+                      <a:prstDash val="solid"/>
+                      <a:round/>
+                      <a:headEnd type="none" w="med" len="med"/>
+                      <a:tailEnd type="none" w="med" len="med"/>
+                    </a:lnL>
+                    <a:lnR w="12700" cap="flat" cmpd="sng" algn="ctr">
+                      <a:solidFill>
+                        <a:schemeClr val="tx1"/>
+                      </a:solidFill>
+                      <a:prstDash val="solid"/>
+                      <a:round/>
+                      <a:headEnd type="none" w="med" len="med"/>
+                      <a:tailEnd type="none" w="med" len="med"/>
+                    </a:lnR>
+                    <a:lnT w="12700" cap="flat" cmpd="sng" algn="ctr">
+                      <a:solidFill>
+                        <a:schemeClr val="tx1"/>
+                      </a:solidFill>
+                      <a:prstDash val="solid"/>
+                      <a:round/>
+                      <a:headEnd type="none" w="med" len="med"/>
+                      <a:tailEnd type="none" w="med" len="med"/>
+                    </a:lnT>
+                    <a:lnB w="12700" cap="flat" cmpd="sng" algn="ctr">
+                      <a:solidFill>
+                        <a:schemeClr val="tx1"/>
+                      </a:solidFill>
+                      <a:prstDash val="solid"/>
+                      <a:round/>
+                      <a:headEnd type="none" w="med" len="med"/>
+                      <a:tailEnd type="none" w="med" len="med"/>
+                    </a:lnB>
+                  </a:tcPr>
+                </a:tc>
+                <a:tc>
+                  <a:txBody>
+                    <a:bodyPr/>
+                    <a:lstStyle/>
+                    <a:p>
+                      <a:pPr algn="ctr"/>
+                      <a:r>
+                        <a:rPr lang="en-US" sz="3200" b="1" dirty="0" smtClean="0"/>
+                        <a:t>O</a:t>
+                      </a:r>
+                      <a:endParaRPr lang="en-US" sz="3200" b="1" dirty="0"/>
+                    </a:p>
+                  </a:txBody>
+                  <a:tcPr>
+                    <a:lnL w="12700" cap="flat" cmpd="sng" algn="ctr">
+                      <a:solidFill>
+                        <a:schemeClr val="tx1"/>
+                      </a:solidFill>
+                      <a:prstDash val="solid"/>
+                      <a:round/>
+                      <a:headEnd type="none" w="med" len="med"/>
+                      <a:tailEnd type="none" w="med" len="med"/>
+                    </a:lnL>
+                    <a:lnR w="12700" cap="flat" cmpd="sng" algn="ctr">
+                      <a:solidFill>
+                        <a:schemeClr val="tx1"/>
+                      </a:solidFill>
+                      <a:prstDash val="solid"/>
+                      <a:round/>
+                      <a:headEnd type="none" w="med" len="med"/>
+                      <a:tailEnd type="none" w="med" len="med"/>
+                    </a:lnR>
+                    <a:lnT w="12700" cap="flat" cmpd="sng" algn="ctr">
+                      <a:solidFill>
+                        <a:schemeClr val="tx1"/>
+                      </a:solidFill>
+                      <a:prstDash val="solid"/>
+                      <a:round/>
+                      <a:headEnd type="none" w="med" len="med"/>
+                      <a:tailEnd type="none" w="med" len="med"/>
+                    </a:lnT>
+                    <a:lnB w="12700" cap="flat" cmpd="sng" algn="ctr">
+                      <a:solidFill>
+                        <a:schemeClr val="tx1"/>
+                      </a:solidFill>
+                      <a:prstDash val="solid"/>
+                      <a:round/>
+                      <a:headEnd type="none" w="med" len="med"/>
+                      <a:tailEnd type="none" w="med" len="med"/>
+                    </a:lnB>
+                  </a:tcPr>
+                </a:tc>
+              </a:tr>
+            </a:tbl>
+          </a:graphicData>
+        </a:graphic>
+      </p:graphicFrame>
+      <p:graphicFrame>
+        <p:nvGraphicFramePr>
+          <p:cNvPr id="12" name="Table 11"/>
+          <p:cNvGraphicFramePr>
+            <a:graphicFrameLocks noGrp="1"/>
+          </p:cNvGraphicFramePr>
+          <p:nvPr>
+            <p:extLst>
+              <p:ext uri="{D42A27DB-BD31-4B8C-83A1-F6EECF244321}">
+                <p14:modId xmlns:p14="http://schemas.microsoft.com/office/powerpoint/2010/main" val="3214647530"/>
+              </p:ext>
+            </p:extLst>
+          </p:nvPr>
+        </p:nvGraphicFramePr>
+        <p:xfrm>
+          <a:off x="2923920" y="3995008"/>
+          <a:ext cx="6502400" cy="579120"/>
+        </p:xfrm>
+        <a:graphic>
+          <a:graphicData uri="http://schemas.openxmlformats.org/drawingml/2006/table">
+            <a:tbl>
+              <a:tblPr>
+                <a:tableStyleId>{5C22544A-7EE6-4342-B048-85BDC9FD1C3A}</a:tableStyleId>
+              </a:tblPr>
+              <a:tblGrid>
+                <a:gridCol w="812800"/>
+                <a:gridCol w="812800"/>
+                <a:gridCol w="812800"/>
+                <a:gridCol w="812800"/>
+                <a:gridCol w="812800"/>
+                <a:gridCol w="812800"/>
+                <a:gridCol w="812800"/>
+                <a:gridCol w="812800"/>
+              </a:tblGrid>
+              <a:tr h="370840">
+                <a:tc>
+                  <a:txBody>
+                    <a:bodyPr/>
+                    <a:lstStyle/>
+                    <a:p>
+                      <a:pPr algn="ctr"/>
+                      <a:r>
+                        <a:rPr lang="en-US" sz="3200" b="1" dirty="0" smtClean="0"/>
+                        <a:t>O</a:t>
+                      </a:r>
+                      <a:endParaRPr lang="en-US" sz="3200" b="1" dirty="0"/>
+                    </a:p>
+                  </a:txBody>
+                  <a:tcPr>
+                    <a:lnL w="12700" cap="flat" cmpd="sng" algn="ctr">
+                      <a:solidFill>
+                        <a:schemeClr val="tx1"/>
+                      </a:solidFill>
+                      <a:prstDash val="solid"/>
+                      <a:round/>
+                      <a:headEnd type="none" w="med" len="med"/>
+                      <a:tailEnd type="none" w="med" len="med"/>
+                    </a:lnL>
+                    <a:lnR w="12700" cap="flat" cmpd="sng" algn="ctr">
+                      <a:solidFill>
+                        <a:schemeClr val="tx1"/>
+                      </a:solidFill>
+                      <a:prstDash val="solid"/>
+                      <a:round/>
+                      <a:headEnd type="none" w="med" len="med"/>
+                      <a:tailEnd type="none" w="med" len="med"/>
+                    </a:lnR>
+                    <a:lnT w="12700" cap="flat" cmpd="sng" algn="ctr">
+                      <a:solidFill>
+                        <a:schemeClr val="tx1"/>
+                      </a:solidFill>
+                      <a:prstDash val="solid"/>
+                      <a:round/>
+                      <a:headEnd type="none" w="med" len="med"/>
+                      <a:tailEnd type="none" w="med" len="med"/>
+                    </a:lnT>
+                    <a:lnB w="12700" cap="flat" cmpd="sng" algn="ctr">
+                      <a:solidFill>
+                        <a:schemeClr val="tx1"/>
+                      </a:solidFill>
+                      <a:prstDash val="solid"/>
+                      <a:round/>
+                      <a:headEnd type="none" w="med" len="med"/>
+                      <a:tailEnd type="none" w="med" len="med"/>
+                    </a:lnB>
+                  </a:tcPr>
+                </a:tc>
+                <a:tc>
+                  <a:txBody>
+                    <a:bodyPr/>
+                    <a:lstStyle/>
+                    <a:p>
+                      <a:pPr algn="ctr"/>
+                      <a:r>
+                        <a:rPr lang="en-US" sz="3200" b="1" dirty="0" smtClean="0">
+                          <a:solidFill>
+                            <a:schemeClr val="tx1"/>
+                          </a:solidFill>
+                        </a:rPr>
+                        <a:t>O</a:t>
+                      </a:r>
+                      <a:endParaRPr lang="en-US" sz="3200" b="1" dirty="0">
+                        <a:solidFill>
+                          <a:schemeClr val="tx1"/>
+                        </a:solidFill>
+                      </a:endParaRPr>
+                    </a:p>
+                  </a:txBody>
+                  <a:tcPr>
+                    <a:lnL w="12700" cap="flat" cmpd="sng" algn="ctr">
+                      <a:solidFill>
+                        <a:schemeClr val="tx1"/>
+                      </a:solidFill>
+                      <a:prstDash val="solid"/>
+                      <a:round/>
+                      <a:headEnd type="none" w="med" len="med"/>
+                      <a:tailEnd type="none" w="med" len="med"/>
+                    </a:lnL>
+                    <a:lnR w="12700" cap="flat" cmpd="sng" algn="ctr">
+                      <a:solidFill>
+                        <a:schemeClr val="tx1"/>
+                      </a:solidFill>
+                      <a:prstDash val="solid"/>
+                      <a:round/>
+                      <a:headEnd type="none" w="med" len="med"/>
+                      <a:tailEnd type="none" w="med" len="med"/>
+                    </a:lnR>
+                    <a:lnT w="12700" cap="flat" cmpd="sng" algn="ctr">
+                      <a:solidFill>
+                        <a:schemeClr val="tx1"/>
+                      </a:solidFill>
+                      <a:prstDash val="solid"/>
+                      <a:round/>
+                      <a:headEnd type="none" w="med" len="med"/>
+                      <a:tailEnd type="none" w="med" len="med"/>
+                    </a:lnT>
+                    <a:lnB w="12700" cap="flat" cmpd="sng" algn="ctr">
+                      <a:solidFill>
+                        <a:schemeClr val="tx1"/>
+                      </a:solidFill>
+                      <a:prstDash val="solid"/>
+                      <a:round/>
+                      <a:headEnd type="none" w="med" len="med"/>
+                      <a:tailEnd type="none" w="med" len="med"/>
+                    </a:lnB>
+                  </a:tcPr>
+                </a:tc>
+                <a:tc>
+                  <a:txBody>
+                    <a:bodyPr/>
+                    <a:lstStyle/>
+                    <a:p>
+                      <a:pPr algn="ctr"/>
+                      <a:r>
+                        <a:rPr lang="en-US" sz="3200" b="1" dirty="0" smtClean="0"/>
+                        <a:t>M</a:t>
+                      </a:r>
+                      <a:endParaRPr lang="en-US" sz="3200" b="1" dirty="0"/>
+                    </a:p>
+                  </a:txBody>
+                  <a:tcPr>
+                    <a:lnL w="12700" cap="flat" cmpd="sng" algn="ctr">
+                      <a:solidFill>
+                        <a:schemeClr val="tx1"/>
+                      </a:solidFill>
+                      <a:prstDash val="solid"/>
+                      <a:round/>
+                      <a:headEnd type="none" w="med" len="med"/>
+                      <a:tailEnd type="none" w="med" len="med"/>
+                    </a:lnL>
+                    <a:lnR w="12700" cap="flat" cmpd="sng" algn="ctr">
+                      <a:solidFill>
+                        <a:schemeClr val="tx1"/>
+                      </a:solidFill>
+                      <a:prstDash val="solid"/>
+                      <a:round/>
+                      <a:headEnd type="none" w="med" len="med"/>
+                      <a:tailEnd type="none" w="med" len="med"/>
+                    </a:lnR>
+                    <a:lnT w="12700" cap="flat" cmpd="sng" algn="ctr">
+                      <a:solidFill>
+                        <a:schemeClr val="tx1"/>
+                      </a:solidFill>
+                      <a:prstDash val="solid"/>
+                      <a:round/>
+                      <a:headEnd type="none" w="med" len="med"/>
+                      <a:tailEnd type="none" w="med" len="med"/>
+                    </a:lnT>
+                    <a:lnB w="12700" cap="flat" cmpd="sng" algn="ctr">
+                      <a:solidFill>
+                        <a:schemeClr val="tx1"/>
+                      </a:solidFill>
+                      <a:prstDash val="solid"/>
+                      <a:round/>
+                      <a:headEnd type="none" w="med" len="med"/>
+                      <a:tailEnd type="none" w="med" len="med"/>
+                    </a:lnB>
+                  </a:tcPr>
+                </a:tc>
+                <a:tc>
+                  <a:txBody>
+                    <a:bodyPr/>
+                    <a:lstStyle/>
+                    <a:p>
+                      <a:pPr algn="ctr"/>
+                      <a:r>
+                        <a:rPr lang="en-US" sz="3200" b="1" dirty="0" smtClean="0">
+                          <a:solidFill>
+                            <a:schemeClr val="tx1"/>
+                          </a:solidFill>
+                        </a:rPr>
+                        <a:t>M</a:t>
+                      </a:r>
+                      <a:endParaRPr lang="en-US" sz="3200" b="1" dirty="0">
+                        <a:solidFill>
+                          <a:schemeClr val="tx1"/>
+                        </a:solidFill>
+                      </a:endParaRPr>
+                    </a:p>
+                  </a:txBody>
+                  <a:tcPr>
+                    <a:lnL w="12700" cap="flat" cmpd="sng" algn="ctr">
+                      <a:solidFill>
+                        <a:schemeClr val="tx1"/>
+                      </a:solidFill>
+                      <a:prstDash val="solid"/>
+                      <a:round/>
+                      <a:headEnd type="none" w="med" len="med"/>
+                      <a:tailEnd type="none" w="med" len="med"/>
+                    </a:lnL>
+                    <a:lnR w="12700" cap="flat" cmpd="sng" algn="ctr">
+                      <a:solidFill>
+                        <a:schemeClr val="tx1"/>
+                      </a:solidFill>
+                      <a:prstDash val="solid"/>
+                      <a:round/>
+                      <a:headEnd type="none" w="med" len="med"/>
+                      <a:tailEnd type="none" w="med" len="med"/>
+                    </a:lnR>
+                    <a:lnT w="12700" cap="flat" cmpd="sng" algn="ctr">
+                      <a:solidFill>
+                        <a:schemeClr val="tx1"/>
+                      </a:solidFill>
+                      <a:prstDash val="solid"/>
+                      <a:round/>
+                      <a:headEnd type="none" w="med" len="med"/>
+                      <a:tailEnd type="none" w="med" len="med"/>
+                    </a:lnT>
+                    <a:lnB w="12700" cap="flat" cmpd="sng" algn="ctr">
+                      <a:solidFill>
+                        <a:schemeClr val="tx1"/>
+                      </a:solidFill>
+                      <a:prstDash val="solid"/>
+                      <a:round/>
+                      <a:headEnd type="none" w="med" len="med"/>
+                      <a:tailEnd type="none" w="med" len="med"/>
+                    </a:lnB>
+                  </a:tcPr>
+                </a:tc>
+                <a:tc>
+                  <a:txBody>
+                    <a:bodyPr/>
+                    <a:lstStyle/>
+                    <a:p>
+                      <a:pPr algn="ctr"/>
+                      <a:r>
+                        <a:rPr lang="en-US" sz="3200" b="1" dirty="0" smtClean="0"/>
+                        <a:t>M</a:t>
+                      </a:r>
+                      <a:endParaRPr lang="en-US" sz="3200" b="1" dirty="0"/>
+                    </a:p>
+                  </a:txBody>
+                  <a:tcPr>
+                    <a:lnL w="12700" cap="flat" cmpd="sng" algn="ctr">
+                      <a:solidFill>
+                        <a:schemeClr val="tx1"/>
+                      </a:solidFill>
+                      <a:prstDash val="solid"/>
+                      <a:round/>
+                      <a:headEnd type="none" w="med" len="med"/>
+                      <a:tailEnd type="none" w="med" len="med"/>
+                    </a:lnL>
+                    <a:lnR w="12700" cap="flat" cmpd="sng" algn="ctr">
+                      <a:solidFill>
+                        <a:schemeClr val="tx1"/>
+                      </a:solidFill>
+                      <a:prstDash val="solid"/>
+                      <a:round/>
+                      <a:headEnd type="none" w="med" len="med"/>
+                      <a:tailEnd type="none" w="med" len="med"/>
+                    </a:lnR>
+                    <a:lnT w="12700" cap="flat" cmpd="sng" algn="ctr">
+                      <a:solidFill>
+                        <a:schemeClr val="tx1"/>
+                      </a:solidFill>
+                      <a:prstDash val="solid"/>
+                      <a:round/>
+                      <a:headEnd type="none" w="med" len="med"/>
+                      <a:tailEnd type="none" w="med" len="med"/>
+                    </a:lnT>
+                    <a:lnB w="12700" cap="flat" cmpd="sng" algn="ctr">
+                      <a:solidFill>
+                        <a:schemeClr val="tx1"/>
+                      </a:solidFill>
+                      <a:prstDash val="solid"/>
+                      <a:round/>
+                      <a:headEnd type="none" w="med" len="med"/>
+                      <a:tailEnd type="none" w="med" len="med"/>
+                    </a:lnB>
+                  </a:tcPr>
+                </a:tc>
+                <a:tc>
+                  <a:txBody>
+                    <a:bodyPr/>
+                    <a:lstStyle/>
+                    <a:p>
+                      <a:pPr algn="ctr"/>
+                      <a:r>
+                        <a:rPr lang="en-US" sz="3200" b="1" dirty="0" smtClean="0"/>
+                        <a:t>M</a:t>
+                      </a:r>
+                      <a:endParaRPr lang="en-US" sz="3200" b="1" dirty="0"/>
+                    </a:p>
+                  </a:txBody>
+                  <a:tcPr>
+                    <a:lnL w="12700" cap="flat" cmpd="sng" algn="ctr">
+                      <a:solidFill>
+                        <a:schemeClr val="tx1"/>
+                      </a:solidFill>
+                      <a:prstDash val="solid"/>
+                      <a:round/>
+                      <a:headEnd type="none" w="med" len="med"/>
+                      <a:tailEnd type="none" w="med" len="med"/>
+                    </a:lnL>
+                    <a:lnR w="12700" cap="flat" cmpd="sng" algn="ctr">
+                      <a:solidFill>
+                        <a:schemeClr val="tx1"/>
+                      </a:solidFill>
+                      <a:prstDash val="solid"/>
+                      <a:round/>
+                      <a:headEnd type="none" w="med" len="med"/>
+                      <a:tailEnd type="none" w="med" len="med"/>
+                    </a:lnR>
+                    <a:lnT w="12700" cap="flat" cmpd="sng" algn="ctr">
+                      <a:solidFill>
+                        <a:schemeClr val="tx1"/>
+                      </a:solidFill>
+                      <a:prstDash val="solid"/>
+                      <a:round/>
+                      <a:headEnd type="none" w="med" len="med"/>
+                      <a:tailEnd type="none" w="med" len="med"/>
+                    </a:lnT>
+                    <a:lnB w="12700" cap="flat" cmpd="sng" algn="ctr">
+                      <a:solidFill>
+                        <a:schemeClr val="tx1"/>
+                      </a:solidFill>
+                      <a:prstDash val="solid"/>
+                      <a:round/>
+                      <a:headEnd type="none" w="med" len="med"/>
+                      <a:tailEnd type="none" w="med" len="med"/>
+                    </a:lnB>
+                  </a:tcPr>
+                </a:tc>
+                <a:tc>
+                  <a:txBody>
+                    <a:bodyPr/>
+                    <a:lstStyle/>
+                    <a:p>
+                      <a:pPr algn="ctr"/>
+                      <a:r>
+                        <a:rPr lang="en-US" sz="3200" b="1" dirty="0" smtClean="0"/>
+                        <a:t>M</a:t>
+                      </a:r>
+                      <a:endParaRPr lang="en-US" sz="3200" b="1" dirty="0"/>
+                    </a:p>
+                  </a:txBody>
+                  <a:tcPr>
+                    <a:lnL w="12700" cap="flat" cmpd="sng" algn="ctr">
+                      <a:solidFill>
+                        <a:schemeClr val="tx1"/>
+                      </a:solidFill>
+                      <a:prstDash val="solid"/>
+                      <a:round/>
+                      <a:headEnd type="none" w="med" len="med"/>
+                      <a:tailEnd type="none" w="med" len="med"/>
+                    </a:lnL>
+                    <a:lnR w="12700" cap="flat" cmpd="sng" algn="ctr">
+                      <a:solidFill>
+                        <a:schemeClr val="tx1"/>
+                      </a:solidFill>
+                      <a:prstDash val="solid"/>
+                      <a:round/>
+                      <a:headEnd type="none" w="med" len="med"/>
+                      <a:tailEnd type="none" w="med" len="med"/>
+                    </a:lnR>
+                    <a:lnT w="12700" cap="flat" cmpd="sng" algn="ctr">
+                      <a:solidFill>
+                        <a:schemeClr val="tx1"/>
+                      </a:solidFill>
+                      <a:prstDash val="solid"/>
+                      <a:round/>
+                      <a:headEnd type="none" w="med" len="med"/>
+                      <a:tailEnd type="none" w="med" len="med"/>
+                    </a:lnT>
+                    <a:lnB w="12700" cap="flat" cmpd="sng" algn="ctr">
+                      <a:solidFill>
+                        <a:schemeClr val="tx1"/>
+                      </a:solidFill>
+                      <a:prstDash val="solid"/>
+                      <a:round/>
+                      <a:headEnd type="none" w="med" len="med"/>
+                      <a:tailEnd type="none" w="med" len="med"/>
+                    </a:lnB>
+                  </a:tcPr>
+                </a:tc>
+                <a:tc>
+                  <a:txBody>
+                    <a:bodyPr/>
+                    <a:lstStyle/>
+                    <a:p>
+                      <a:pPr algn="ctr"/>
+                      <a:r>
+                        <a:rPr lang="en-US" sz="3200" b="1" dirty="0" smtClean="0"/>
+                        <a:t>O</a:t>
+                      </a:r>
+                      <a:endParaRPr lang="en-US" sz="3200" b="1" dirty="0"/>
+                    </a:p>
+                  </a:txBody>
+                  <a:tcPr>
+                    <a:lnL w="12700" cap="flat" cmpd="sng" algn="ctr">
+                      <a:solidFill>
+                        <a:schemeClr val="tx1"/>
+                      </a:solidFill>
+                      <a:prstDash val="solid"/>
+                      <a:round/>
+                      <a:headEnd type="none" w="med" len="med"/>
+                      <a:tailEnd type="none" w="med" len="med"/>
+                    </a:lnL>
+                    <a:lnR w="12700" cap="flat" cmpd="sng" algn="ctr">
+                      <a:solidFill>
+                        <a:schemeClr val="tx1"/>
+                      </a:solidFill>
+                      <a:prstDash val="solid"/>
+                      <a:round/>
+                      <a:headEnd type="none" w="med" len="med"/>
+                      <a:tailEnd type="none" w="med" len="med"/>
+                    </a:lnR>
+                    <a:lnT w="12700" cap="flat" cmpd="sng" algn="ctr">
+                      <a:solidFill>
+                        <a:schemeClr val="tx1"/>
+                      </a:solidFill>
+                      <a:prstDash val="solid"/>
+                      <a:round/>
+                      <a:headEnd type="none" w="med" len="med"/>
+                      <a:tailEnd type="none" w="med" len="med"/>
+                    </a:lnT>
+                    <a:lnB w="12700" cap="flat" cmpd="sng" algn="ctr">
+                      <a:solidFill>
+                        <a:schemeClr val="tx1"/>
+                      </a:solidFill>
+                      <a:prstDash val="solid"/>
+                      <a:round/>
+                      <a:headEnd type="none" w="med" len="med"/>
+                      <a:tailEnd type="none" w="med" len="med"/>
+                    </a:lnB>
+                  </a:tcPr>
+                </a:tc>
+              </a:tr>
+            </a:tbl>
+          </a:graphicData>
+        </a:graphic>
+      </p:graphicFrame>
+      <p:graphicFrame>
+        <p:nvGraphicFramePr>
+          <p:cNvPr id="13" name="Table 12"/>
+          <p:cNvGraphicFramePr>
+            <a:graphicFrameLocks noGrp="1"/>
+          </p:cNvGraphicFramePr>
+          <p:nvPr>
+            <p:extLst>
+              <p:ext uri="{D42A27DB-BD31-4B8C-83A1-F6EECF244321}">
+                <p14:modId xmlns:p14="http://schemas.microsoft.com/office/powerpoint/2010/main" val="1671727508"/>
+              </p:ext>
+            </p:extLst>
+          </p:nvPr>
+        </p:nvGraphicFramePr>
+        <p:xfrm>
+          <a:off x="2866460" y="4776992"/>
+          <a:ext cx="6502400" cy="579120"/>
+        </p:xfrm>
+        <a:graphic>
+          <a:graphicData uri="http://schemas.openxmlformats.org/drawingml/2006/table">
+            <a:tbl>
+              <a:tblPr>
+                <a:tableStyleId>{5C22544A-7EE6-4342-B048-85BDC9FD1C3A}</a:tableStyleId>
+              </a:tblPr>
+              <a:tblGrid>
+                <a:gridCol w="812800"/>
+                <a:gridCol w="812800"/>
+                <a:gridCol w="812800"/>
+                <a:gridCol w="812800"/>
+                <a:gridCol w="812800"/>
+                <a:gridCol w="812800"/>
+                <a:gridCol w="812800"/>
+                <a:gridCol w="812800"/>
+              </a:tblGrid>
+              <a:tr h="370840">
+                <a:tc>
+                  <a:txBody>
+                    <a:bodyPr/>
+                    <a:lstStyle/>
+                    <a:p>
+                      <a:pPr algn="ctr"/>
+                      <a:r>
+                        <a:rPr lang="en-US" sz="3200" b="1" dirty="0" smtClean="0"/>
+                        <a:t>O</a:t>
+                      </a:r>
+                      <a:endParaRPr lang="en-US" sz="3200" b="1" dirty="0"/>
+                    </a:p>
+                  </a:txBody>
+                  <a:tcPr>
+                    <a:lnL w="12700" cap="flat" cmpd="sng" algn="ctr">
+                      <a:solidFill>
+                        <a:schemeClr val="tx1"/>
+                      </a:solidFill>
+                      <a:prstDash val="solid"/>
+                      <a:round/>
+                      <a:headEnd type="none" w="med" len="med"/>
+                      <a:tailEnd type="none" w="med" len="med"/>
+                    </a:lnL>
+                    <a:lnR w="12700" cap="flat" cmpd="sng" algn="ctr">
+                      <a:solidFill>
+                        <a:schemeClr val="tx1"/>
+                      </a:solidFill>
+                      <a:prstDash val="solid"/>
+                      <a:round/>
+                      <a:headEnd type="none" w="med" len="med"/>
+                      <a:tailEnd type="none" w="med" len="med"/>
+                    </a:lnR>
+                    <a:lnT w="12700" cap="flat" cmpd="sng" algn="ctr">
+                      <a:solidFill>
+                        <a:schemeClr val="tx1"/>
+                      </a:solidFill>
+                      <a:prstDash val="solid"/>
+                      <a:round/>
+                      <a:headEnd type="none" w="med" len="med"/>
+                      <a:tailEnd type="none" w="med" len="med"/>
+                    </a:lnT>
+                    <a:lnB w="12700" cap="flat" cmpd="sng" algn="ctr">
+                      <a:solidFill>
+                        <a:schemeClr val="tx1"/>
+                      </a:solidFill>
+                      <a:prstDash val="solid"/>
+                      <a:round/>
+                      <a:headEnd type="none" w="med" len="med"/>
+                      <a:tailEnd type="none" w="med" len="med"/>
+                    </a:lnB>
+                  </a:tcPr>
+                </a:tc>
+                <a:tc>
+                  <a:txBody>
+                    <a:bodyPr/>
+                    <a:lstStyle/>
+                    <a:p>
+                      <a:pPr algn="ctr"/>
+                      <a:r>
+                        <a:rPr lang="en-US" sz="3200" b="1" dirty="0" smtClean="0">
+                          <a:solidFill>
+                            <a:schemeClr val="tx1"/>
+                          </a:solidFill>
+                        </a:rPr>
+                        <a:t>O</a:t>
+                      </a:r>
+                      <a:endParaRPr lang="en-US" sz="3200" b="1" dirty="0">
+                        <a:solidFill>
+                          <a:schemeClr val="tx1"/>
+                        </a:solidFill>
+                      </a:endParaRPr>
+                    </a:p>
+                  </a:txBody>
+                  <a:tcPr>
+                    <a:lnL w="12700" cap="flat" cmpd="sng" algn="ctr">
+                      <a:solidFill>
+                        <a:schemeClr val="tx1"/>
+                      </a:solidFill>
+                      <a:prstDash val="solid"/>
+                      <a:round/>
+                      <a:headEnd type="none" w="med" len="med"/>
+                      <a:tailEnd type="none" w="med" len="med"/>
+                    </a:lnL>
+                    <a:lnR w="12700" cap="flat" cmpd="sng" algn="ctr">
+                      <a:solidFill>
+                        <a:schemeClr val="tx1"/>
+                      </a:solidFill>
+                      <a:prstDash val="solid"/>
+                      <a:round/>
+                      <a:headEnd type="none" w="med" len="med"/>
+                      <a:tailEnd type="none" w="med" len="med"/>
+                    </a:lnR>
+                    <a:lnT w="12700" cap="flat" cmpd="sng" algn="ctr">
+                      <a:solidFill>
+                        <a:schemeClr val="tx1"/>
+                      </a:solidFill>
+                      <a:prstDash val="solid"/>
+                      <a:round/>
+                      <a:headEnd type="none" w="med" len="med"/>
+                      <a:tailEnd type="none" w="med" len="med"/>
+                    </a:lnT>
+                    <a:lnB w="12700" cap="flat" cmpd="sng" algn="ctr">
+                      <a:solidFill>
+                        <a:schemeClr val="tx1"/>
+                      </a:solidFill>
+                      <a:prstDash val="solid"/>
+                      <a:round/>
+                      <a:headEnd type="none" w="med" len="med"/>
+                      <a:tailEnd type="none" w="med" len="med"/>
+                    </a:lnB>
+                  </a:tcPr>
+                </a:tc>
+                <a:tc>
+                  <a:txBody>
+                    <a:bodyPr/>
+                    <a:lstStyle/>
+                    <a:p>
+                      <a:pPr algn="ctr"/>
+                      <a:r>
+                        <a:rPr lang="en-US" sz="3200" b="1" dirty="0" smtClean="0"/>
+                        <a:t>O</a:t>
+                      </a:r>
+                      <a:endParaRPr lang="en-US" sz="3200" b="1" dirty="0"/>
+                    </a:p>
+                  </a:txBody>
+                  <a:tcPr>
+                    <a:lnL w="12700" cap="flat" cmpd="sng" algn="ctr">
+                      <a:solidFill>
+                        <a:schemeClr val="tx1"/>
+                      </a:solidFill>
+                      <a:prstDash val="solid"/>
+                      <a:round/>
+                      <a:headEnd type="none" w="med" len="med"/>
+                      <a:tailEnd type="none" w="med" len="med"/>
+                    </a:lnL>
+                    <a:lnR w="12700" cap="flat" cmpd="sng" algn="ctr">
+                      <a:solidFill>
+                        <a:schemeClr val="tx1"/>
+                      </a:solidFill>
+                      <a:prstDash val="solid"/>
+                      <a:round/>
+                      <a:headEnd type="none" w="med" len="med"/>
+                      <a:tailEnd type="none" w="med" len="med"/>
+                    </a:lnR>
+                    <a:lnT w="12700" cap="flat" cmpd="sng" algn="ctr">
+                      <a:solidFill>
+                        <a:schemeClr val="tx1"/>
+                      </a:solidFill>
+                      <a:prstDash val="solid"/>
+                      <a:round/>
+                      <a:headEnd type="none" w="med" len="med"/>
+                      <a:tailEnd type="none" w="med" len="med"/>
+                    </a:lnT>
+                    <a:lnB w="12700" cap="flat" cmpd="sng" algn="ctr">
+                      <a:solidFill>
+                        <a:schemeClr val="tx1"/>
+                      </a:solidFill>
+                      <a:prstDash val="solid"/>
+                      <a:round/>
+                      <a:headEnd type="none" w="med" len="med"/>
+                      <a:tailEnd type="none" w="med" len="med"/>
+                    </a:lnB>
+                  </a:tcPr>
+                </a:tc>
+                <a:tc>
+                  <a:txBody>
+                    <a:bodyPr/>
+                    <a:lstStyle/>
+                    <a:p>
+                      <a:pPr algn="ctr"/>
+                      <a:r>
+                        <a:rPr lang="en-US" sz="3200" b="1" dirty="0" smtClean="0">
+                          <a:solidFill>
+                            <a:schemeClr val="tx1"/>
+                          </a:solidFill>
+                        </a:rPr>
+                        <a:t>M</a:t>
+                      </a:r>
+                      <a:endParaRPr lang="en-US" sz="3200" b="1" dirty="0">
+                        <a:solidFill>
+                          <a:schemeClr val="tx1"/>
+                        </a:solidFill>
+                      </a:endParaRPr>
+                    </a:p>
+                  </a:txBody>
+                  <a:tcPr>
+                    <a:lnL w="12700" cap="flat" cmpd="sng" algn="ctr">
+                      <a:solidFill>
+                        <a:schemeClr val="tx1"/>
+                      </a:solidFill>
+                      <a:prstDash val="solid"/>
+                      <a:round/>
+                      <a:headEnd type="none" w="med" len="med"/>
+                      <a:tailEnd type="none" w="med" len="med"/>
+                    </a:lnL>
+                    <a:lnR w="12700" cap="flat" cmpd="sng" algn="ctr">
+                      <a:solidFill>
+                        <a:schemeClr val="tx1"/>
+                      </a:solidFill>
+                      <a:prstDash val="solid"/>
+                      <a:round/>
+                      <a:headEnd type="none" w="med" len="med"/>
+                      <a:tailEnd type="none" w="med" len="med"/>
+                    </a:lnR>
+                    <a:lnT w="12700" cap="flat" cmpd="sng" algn="ctr">
+                      <a:solidFill>
+                        <a:schemeClr val="tx1"/>
+                      </a:solidFill>
+                      <a:prstDash val="solid"/>
+                      <a:round/>
+                      <a:headEnd type="none" w="med" len="med"/>
+                      <a:tailEnd type="none" w="med" len="med"/>
+                    </a:lnT>
+                    <a:lnB w="12700" cap="flat" cmpd="sng" algn="ctr">
+                      <a:solidFill>
+                        <a:schemeClr val="tx1"/>
+                      </a:solidFill>
+                      <a:prstDash val="solid"/>
+                      <a:round/>
+                      <a:headEnd type="none" w="med" len="med"/>
+                      <a:tailEnd type="none" w="med" len="med"/>
+                    </a:lnB>
+                  </a:tcPr>
+                </a:tc>
+                <a:tc>
+                  <a:txBody>
+                    <a:bodyPr/>
+                    <a:lstStyle/>
+                    <a:p>
+                      <a:pPr algn="ctr"/>
+                      <a:r>
+                        <a:rPr lang="en-US" sz="3200" b="1" dirty="0" smtClean="0"/>
+                        <a:t>M</a:t>
+                      </a:r>
+                      <a:endParaRPr lang="en-US" sz="3200" b="1" dirty="0"/>
+                    </a:p>
+                  </a:txBody>
+                  <a:tcPr>
+                    <a:lnL w="12700" cap="flat" cmpd="sng" algn="ctr">
+                      <a:solidFill>
+                        <a:schemeClr val="tx1"/>
+                      </a:solidFill>
+                      <a:prstDash val="solid"/>
+                      <a:round/>
+                      <a:headEnd type="none" w="med" len="med"/>
+                      <a:tailEnd type="none" w="med" len="med"/>
+                    </a:lnL>
+                    <a:lnR w="12700" cap="flat" cmpd="sng" algn="ctr">
+                      <a:solidFill>
+                        <a:schemeClr val="tx1"/>
+                      </a:solidFill>
+                      <a:prstDash val="solid"/>
+                      <a:round/>
+                      <a:headEnd type="none" w="med" len="med"/>
+                      <a:tailEnd type="none" w="med" len="med"/>
+                    </a:lnR>
+                    <a:lnT w="12700" cap="flat" cmpd="sng" algn="ctr">
+                      <a:solidFill>
+                        <a:schemeClr val="tx1"/>
+                      </a:solidFill>
+                      <a:prstDash val="solid"/>
+                      <a:round/>
+                      <a:headEnd type="none" w="med" len="med"/>
+                      <a:tailEnd type="none" w="med" len="med"/>
+                    </a:lnT>
+                    <a:lnB w="12700" cap="flat" cmpd="sng" algn="ctr">
+                      <a:solidFill>
+                        <a:schemeClr val="tx1"/>
+                      </a:solidFill>
+                      <a:prstDash val="solid"/>
+                      <a:round/>
+                      <a:headEnd type="none" w="med" len="med"/>
+                      <a:tailEnd type="none" w="med" len="med"/>
+                    </a:lnB>
+                  </a:tcPr>
+                </a:tc>
+                <a:tc>
+                  <a:txBody>
+                    <a:bodyPr/>
+                    <a:lstStyle/>
+                    <a:p>
+                      <a:pPr algn="ctr"/>
+                      <a:r>
+                        <a:rPr lang="en-US" sz="3200" b="1" dirty="0" smtClean="0"/>
+                        <a:t>M</a:t>
+                      </a:r>
+                      <a:endParaRPr lang="en-US" sz="3200" b="1" dirty="0"/>
+                    </a:p>
+                  </a:txBody>
+                  <a:tcPr>
+                    <a:lnL w="12700" cap="flat" cmpd="sng" algn="ctr">
+                      <a:solidFill>
+                        <a:schemeClr val="tx1"/>
+                      </a:solidFill>
+                      <a:prstDash val="solid"/>
+                      <a:round/>
+                      <a:headEnd type="none" w="med" len="med"/>
+                      <a:tailEnd type="none" w="med" len="med"/>
+                    </a:lnL>
+                    <a:lnR w="12700" cap="flat" cmpd="sng" algn="ctr">
+                      <a:solidFill>
+                        <a:schemeClr val="tx1"/>
+                      </a:solidFill>
+                      <a:prstDash val="solid"/>
+                      <a:round/>
+                      <a:headEnd type="none" w="med" len="med"/>
+                      <a:tailEnd type="none" w="med" len="med"/>
+                    </a:lnR>
+                    <a:lnT w="12700" cap="flat" cmpd="sng" algn="ctr">
+                      <a:solidFill>
+                        <a:schemeClr val="tx1"/>
+                      </a:solidFill>
+                      <a:prstDash val="solid"/>
+                      <a:round/>
+                      <a:headEnd type="none" w="med" len="med"/>
+                      <a:tailEnd type="none" w="med" len="med"/>
+                    </a:lnT>
+                    <a:lnB w="12700" cap="flat" cmpd="sng" algn="ctr">
+                      <a:solidFill>
+                        <a:schemeClr val="tx1"/>
+                      </a:solidFill>
+                      <a:prstDash val="solid"/>
+                      <a:round/>
+                      <a:headEnd type="none" w="med" len="med"/>
+                      <a:tailEnd type="none" w="med" len="med"/>
+                    </a:lnB>
+                  </a:tcPr>
+                </a:tc>
+                <a:tc>
+                  <a:txBody>
+                    <a:bodyPr/>
+                    <a:lstStyle/>
+                    <a:p>
+                      <a:pPr algn="ctr"/>
+                      <a:r>
+                        <a:rPr lang="en-US" sz="3200" b="1" dirty="0" smtClean="0"/>
+                        <a:t>M</a:t>
+                      </a:r>
+                      <a:endParaRPr lang="en-US" sz="3200" b="1" dirty="0"/>
+                    </a:p>
+                  </a:txBody>
+                  <a:tcPr>
+                    <a:lnL w="12700" cap="flat" cmpd="sng" algn="ctr">
+                      <a:solidFill>
+                        <a:schemeClr val="tx1"/>
+                      </a:solidFill>
+                      <a:prstDash val="solid"/>
+                      <a:round/>
+                      <a:headEnd type="none" w="med" len="med"/>
+                      <a:tailEnd type="none" w="med" len="med"/>
+                    </a:lnL>
+                    <a:lnR w="12700" cap="flat" cmpd="sng" algn="ctr">
+                      <a:solidFill>
+                        <a:schemeClr val="tx1"/>
+                      </a:solidFill>
+                      <a:prstDash val="solid"/>
+                      <a:round/>
+                      <a:headEnd type="none" w="med" len="med"/>
+                      <a:tailEnd type="none" w="med" len="med"/>
+                    </a:lnR>
+                    <a:lnT w="12700" cap="flat" cmpd="sng" algn="ctr">
+                      <a:solidFill>
+                        <a:schemeClr val="tx1"/>
+                      </a:solidFill>
+                      <a:prstDash val="solid"/>
+                      <a:round/>
+                      <a:headEnd type="none" w="med" len="med"/>
+                      <a:tailEnd type="none" w="med" len="med"/>
+                    </a:lnT>
+                    <a:lnB w="12700" cap="flat" cmpd="sng" algn="ctr">
+                      <a:solidFill>
+                        <a:schemeClr val="tx1"/>
+                      </a:solidFill>
+                      <a:prstDash val="solid"/>
+                      <a:round/>
+                      <a:headEnd type="none" w="med" len="med"/>
+                      <a:tailEnd type="none" w="med" len="med"/>
+                    </a:lnB>
+                  </a:tcPr>
+                </a:tc>
+                <a:tc>
+                  <a:txBody>
+                    <a:bodyPr/>
+                    <a:lstStyle/>
+                    <a:p>
+                      <a:pPr algn="ctr"/>
+                      <a:r>
+                        <a:rPr lang="en-US" sz="3200" b="1" dirty="0" smtClean="0"/>
+                        <a:t>M</a:t>
+                      </a:r>
+                      <a:endParaRPr lang="en-US" sz="3200" b="1" dirty="0"/>
+                    </a:p>
+                  </a:txBody>
+                  <a:tcPr>
+                    <a:lnL w="12700" cap="flat" cmpd="sng" algn="ctr">
+                      <a:solidFill>
+                        <a:schemeClr val="tx1"/>
+                      </a:solidFill>
+                      <a:prstDash val="solid"/>
+                      <a:round/>
+                      <a:headEnd type="none" w="med" len="med"/>
+                      <a:tailEnd type="none" w="med" len="med"/>
+                    </a:lnL>
+                    <a:lnR w="12700" cap="flat" cmpd="sng" algn="ctr">
+                      <a:solidFill>
+                        <a:schemeClr val="tx1"/>
+                      </a:solidFill>
+                      <a:prstDash val="solid"/>
+                      <a:round/>
+                      <a:headEnd type="none" w="med" len="med"/>
+                      <a:tailEnd type="none" w="med" len="med"/>
+                    </a:lnR>
+                    <a:lnT w="12700" cap="flat" cmpd="sng" algn="ctr">
+                      <a:solidFill>
+                        <a:schemeClr val="tx1"/>
+                      </a:solidFill>
+                      <a:prstDash val="solid"/>
+                      <a:round/>
+                      <a:headEnd type="none" w="med" len="med"/>
+                      <a:tailEnd type="none" w="med" len="med"/>
+                    </a:lnT>
+                    <a:lnB w="12700" cap="flat" cmpd="sng" algn="ctr">
+                      <a:solidFill>
+                        <a:schemeClr val="tx1"/>
+                      </a:solidFill>
+                      <a:prstDash val="solid"/>
+                      <a:round/>
+                      <a:headEnd type="none" w="med" len="med"/>
+                      <a:tailEnd type="none" w="med" len="med"/>
+                    </a:lnB>
+                  </a:tcPr>
+                </a:tc>
+              </a:tr>
+            </a:tbl>
+          </a:graphicData>
+        </a:graphic>
+      </p:graphicFrame>
+      <p:sp>
+        <p:nvSpPr>
+          <p:cNvPr id="2" name="Rectangle 1"/>
+          <p:cNvSpPr/>
+          <p:nvPr/>
+        </p:nvSpPr>
+        <p:spPr>
+          <a:xfrm>
+            <a:off x="6086007" y="2278505"/>
+            <a:ext cx="1019331" cy="3357798"/>
+          </a:xfrm>
+          <a:prstGeom prst="rect">
+            <a:avLst/>
+          </a:prstGeom>
+          <a:noFill/>
+          <a:ln w="50800">
+            <a:solidFill>
+              <a:srgbClr val="FF0000"/>
+            </a:solidFill>
+          </a:ln>
+        </p:spPr>
+        <p:style>
+          <a:lnRef idx="2">
+            <a:schemeClr val="accent1">
+              <a:shade val="50000"/>
+            </a:schemeClr>
+          </a:lnRef>
+          <a:fillRef idx="1">
+            <a:schemeClr val="accent1"/>
+          </a:fillRef>
+          <a:effectRef idx="0">
+            <a:schemeClr val="accent1"/>
+          </a:effectRef>
+          <a:fontRef idx="minor">
+            <a:schemeClr val="lt1"/>
+          </a:fontRef>
+        </p:style>
+        <p:txBody>
+          <a:bodyPr rtlCol="0" anchor="ctr"/>
+          <a:lstStyle/>
+          <a:p>
+            <a:pPr algn="ctr"/>
+            <a:endParaRPr lang="en-US"/>
+          </a:p>
+        </p:txBody>
+      </p:sp>
+      <p:sp>
+        <p:nvSpPr>
+          <p:cNvPr id="3" name="Down Arrow 2"/>
+          <p:cNvSpPr/>
+          <p:nvPr/>
+        </p:nvSpPr>
+        <p:spPr>
+          <a:xfrm>
+            <a:off x="5561351" y="1169233"/>
+            <a:ext cx="404734" cy="1109272"/>
+          </a:xfrm>
+          <a:prstGeom prst="downArrow">
+            <a:avLst/>
+          </a:prstGeom>
+          <a:noFill/>
+        </p:spPr>
+        <p:style>
+          <a:lnRef idx="2">
+            <a:schemeClr val="accent1">
+              <a:shade val="50000"/>
+            </a:schemeClr>
+          </a:lnRef>
+          <a:fillRef idx="1">
+            <a:schemeClr val="accent1"/>
+          </a:fillRef>
+          <a:effectRef idx="0">
+            <a:schemeClr val="accent1"/>
+          </a:effectRef>
+          <a:fontRef idx="minor">
+            <a:schemeClr val="lt1"/>
+          </a:fontRef>
+        </p:style>
+        <p:txBody>
+          <a:bodyPr rtlCol="0" anchor="ctr"/>
+          <a:lstStyle/>
+          <a:p>
+            <a:pPr algn="ctr"/>
+            <a:endParaRPr lang="en-US"/>
+          </a:p>
+        </p:txBody>
+      </p:sp>
+      <p:sp>
+        <p:nvSpPr>
+          <p:cNvPr id="14" name="TextBox 13"/>
+          <p:cNvSpPr txBox="1"/>
+          <p:nvPr/>
+        </p:nvSpPr>
+        <p:spPr>
+          <a:xfrm>
+            <a:off x="5763718" y="1462259"/>
+            <a:ext cx="4392118" cy="523220"/>
+          </a:xfrm>
+          <a:prstGeom prst="rect">
+            <a:avLst/>
+          </a:prstGeom>
+          <a:noFill/>
+        </p:spPr>
+        <p:txBody>
+          <a:bodyPr wrap="square" rtlCol="0">
+            <a:spAutoFit/>
+          </a:bodyPr>
+          <a:lstStyle/>
+          <a:p>
+            <a:pPr algn="ctr"/>
+            <a:r>
+              <a:rPr lang="en-US" sz="2800" b="1" dirty="0" smtClean="0"/>
+              <a:t>Partition around Median</a:t>
+            </a:r>
+            <a:endParaRPr lang="en-US" sz="2800" b="1" dirty="0"/>
+          </a:p>
+        </p:txBody>
+      </p:sp>
+      <p:sp>
+        <p:nvSpPr>
+          <p:cNvPr id="15" name="TextBox 14"/>
+          <p:cNvSpPr txBox="1"/>
+          <p:nvPr/>
+        </p:nvSpPr>
+        <p:spPr>
+          <a:xfrm>
+            <a:off x="9758597" y="3049463"/>
+            <a:ext cx="2038662" cy="1815882"/>
+          </a:xfrm>
+          <a:prstGeom prst="rect">
+            <a:avLst/>
+          </a:prstGeom>
+          <a:noFill/>
+        </p:spPr>
+        <p:txBody>
+          <a:bodyPr wrap="square" rtlCol="0">
+            <a:spAutoFit/>
+          </a:bodyPr>
+          <a:lstStyle/>
+          <a:p>
+            <a:pPr algn="ctr"/>
+            <a:r>
+              <a:rPr lang="en-US" sz="2800" b="1" dirty="0" smtClean="0"/>
+              <a:t>Various Possibilities after Partition</a:t>
+            </a:r>
+            <a:endParaRPr lang="en-US" sz="2800" b="1" dirty="0"/>
+          </a:p>
+        </p:txBody>
+      </p:sp>
+    </p:spTree>
+    <p:extLst>
+      <p:ext uri="{BB962C8B-B14F-4D97-AF65-F5344CB8AC3E}">
+        <p14:creationId xmlns:p14="http://schemas.microsoft.com/office/powerpoint/2010/main" val="886504393"/>
       </p:ext>
     </p:extLst>
   </p:cSld>

</xml_diff>